<commit_message>
pushing up v1 of the project. All code functional, but results not where I want them yet
</commit_message>
<xml_diff>
--- a/Using Neural Networks to Decode Brainwaves - Technical.pptx
+++ b/Using Neural Networks to Decode Brainwaves - Technical.pptx
@@ -8,14 +8,16 @@
     <p:sldId id="256" r:id="rId2"/>
     <p:sldId id="258" r:id="rId3"/>
     <p:sldId id="266" r:id="rId4"/>
-    <p:sldId id="267" r:id="rId5"/>
-    <p:sldId id="268" r:id="rId6"/>
-    <p:sldId id="262" r:id="rId7"/>
-    <p:sldId id="269" r:id="rId8"/>
-    <p:sldId id="263" r:id="rId9"/>
-    <p:sldId id="257" r:id="rId10"/>
-    <p:sldId id="265" r:id="rId11"/>
-    <p:sldId id="264" r:id="rId12"/>
+    <p:sldId id="270" r:id="rId5"/>
+    <p:sldId id="271" r:id="rId6"/>
+    <p:sldId id="267" r:id="rId7"/>
+    <p:sldId id="268" r:id="rId8"/>
+    <p:sldId id="262" r:id="rId9"/>
+    <p:sldId id="269" r:id="rId10"/>
+    <p:sldId id="263" r:id="rId11"/>
+    <p:sldId id="257" r:id="rId12"/>
+    <p:sldId id="265" r:id="rId13"/>
+    <p:sldId id="264" r:id="rId14"/>
   </p:sldIdLst>
   <p:sldSz cx="12192000" cy="6858000"/>
   <p:notesSz cx="6858000" cy="9144000"/>
@@ -348,7 +350,7 @@
           <a:p>
             <a:fld id="{DEC3455B-A3AE-4C1B-89BE-514E8BE0F8CE}" type="datetimeFigureOut">
               <a:rPr lang="en-US" smtClean="0"/>
-              <a:t>7/19/2022</a:t>
+              <a:t>7/20/2022</a:t>
             </a:fld>
             <a:endParaRPr lang="en-US"/>
           </a:p>
@@ -642,7 +644,7 @@
           <a:p>
             <a:fld id="{DEC3455B-A3AE-4C1B-89BE-514E8BE0F8CE}" type="datetimeFigureOut">
               <a:rPr lang="en-US" smtClean="0"/>
-              <a:t>7/19/2022</a:t>
+              <a:t>7/20/2022</a:t>
             </a:fld>
             <a:endParaRPr lang="en-US"/>
           </a:p>
@@ -816,7 +818,7 @@
           <a:p>
             <a:fld id="{DEC3455B-A3AE-4C1B-89BE-514E8BE0F8CE}" type="datetimeFigureOut">
               <a:rPr lang="en-US" smtClean="0"/>
-              <a:t>7/19/2022</a:t>
+              <a:t>7/20/2022</a:t>
             </a:fld>
             <a:endParaRPr lang="en-US"/>
           </a:p>
@@ -1159,7 +1161,7 @@
           <a:p>
             <a:fld id="{DEC3455B-A3AE-4C1B-89BE-514E8BE0F8CE}" type="datetimeFigureOut">
               <a:rPr lang="en-US" smtClean="0"/>
-              <a:t>7/19/2022</a:t>
+              <a:t>7/20/2022</a:t>
             </a:fld>
             <a:endParaRPr lang="en-US"/>
           </a:p>
@@ -1406,7 +1408,7 @@
           <a:p>
             <a:fld id="{DEC3455B-A3AE-4C1B-89BE-514E8BE0F8CE}" type="datetimeFigureOut">
               <a:rPr lang="en-US" smtClean="0"/>
-              <a:t>7/19/2022</a:t>
+              <a:t>7/20/2022</a:t>
             </a:fld>
             <a:endParaRPr lang="en-US"/>
           </a:p>
@@ -1562,7 +1564,7 @@
           <a:p>
             <a:fld id="{DEC3455B-A3AE-4C1B-89BE-514E8BE0F8CE}" type="datetimeFigureOut">
               <a:rPr lang="en-US" smtClean="0"/>
-              <a:t>7/19/2022</a:t>
+              <a:t>7/20/2022</a:t>
             </a:fld>
             <a:endParaRPr lang="en-US"/>
           </a:p>
@@ -1733,7 +1735,7 @@
           <a:p>
             <a:fld id="{DEC3455B-A3AE-4C1B-89BE-514E8BE0F8CE}" type="datetimeFigureOut">
               <a:rPr lang="en-US" smtClean="0"/>
-              <a:t>7/19/2022</a:t>
+              <a:t>7/20/2022</a:t>
             </a:fld>
             <a:endParaRPr lang="en-US"/>
           </a:p>
@@ -2087,7 +2089,7 @@
           <a:p>
             <a:fld id="{DEC3455B-A3AE-4C1B-89BE-514E8BE0F8CE}" type="datetimeFigureOut">
               <a:rPr lang="en-US" smtClean="0"/>
-              <a:t>7/19/2022</a:t>
+              <a:t>7/20/2022</a:t>
             </a:fld>
             <a:endParaRPr lang="en-US"/>
           </a:p>
@@ -2469,7 +2471,7 @@
           <a:p>
             <a:fld id="{DEC3455B-A3AE-4C1B-89BE-514E8BE0F8CE}" type="datetimeFigureOut">
               <a:rPr lang="en-US" smtClean="0"/>
-              <a:t>7/19/2022</a:t>
+              <a:t>7/20/2022</a:t>
             </a:fld>
             <a:endParaRPr lang="en-US"/>
           </a:p>
@@ -2639,7 +2641,7 @@
           <a:p>
             <a:fld id="{DEC3455B-A3AE-4C1B-89BE-514E8BE0F8CE}" type="datetimeFigureOut">
               <a:rPr lang="en-US" smtClean="0"/>
-              <a:t>7/19/2022</a:t>
+              <a:t>7/20/2022</a:t>
             </a:fld>
             <a:endParaRPr lang="en-US"/>
           </a:p>
@@ -2926,7 +2928,7 @@
           <a:p>
             <a:fld id="{DEC3455B-A3AE-4C1B-89BE-514E8BE0F8CE}" type="datetimeFigureOut">
               <a:rPr lang="en-US" smtClean="0"/>
-              <a:t>7/19/2022</a:t>
+              <a:t>7/20/2022</a:t>
             </a:fld>
             <a:endParaRPr lang="en-US"/>
           </a:p>
@@ -3521,6 +3523,754 @@
 </file>
 
 <file path=ppt/slides/slide10.xml><?xml version="1.0" encoding="utf-8"?>
+<p:sld xmlns:a="http://schemas.openxmlformats.org/drawingml/2006/main" xmlns:r="http://schemas.openxmlformats.org/officeDocument/2006/relationships" xmlns:p="http://schemas.openxmlformats.org/presentationml/2006/main">
+  <p:cSld>
+    <p:spTree>
+      <p:nvGrpSpPr>
+        <p:cNvPr id="1" name=""/>
+        <p:cNvGrpSpPr/>
+        <p:nvPr/>
+      </p:nvGrpSpPr>
+      <p:grpSpPr>
+        <a:xfrm>
+          <a:off x="0" y="0"/>
+          <a:ext cx="0" cy="0"/>
+          <a:chOff x="0" y="0"/>
+          <a:chExt cx="0" cy="0"/>
+        </a:xfrm>
+      </p:grpSpPr>
+      <p:sp>
+        <p:nvSpPr>
+          <p:cNvPr id="2" name="Title 1">
+            <a:extLst>
+              <a:ext uri="{FF2B5EF4-FFF2-40B4-BE49-F238E27FC236}">
+                <a16:creationId xmlns:a16="http://schemas.microsoft.com/office/drawing/2014/main" id="{74F9A59A-8F85-8064-2061-246353F06F08}"/>
+              </a:ext>
+            </a:extLst>
+          </p:cNvPr>
+          <p:cNvSpPr>
+            <a:spLocks noGrp="1"/>
+          </p:cNvSpPr>
+          <p:nvPr>
+            <p:ph type="title"/>
+          </p:nvPr>
+        </p:nvSpPr>
+        <p:spPr/>
+        <p:txBody>
+          <a:bodyPr>
+            <a:normAutofit fontScale="90000"/>
+          </a:bodyPr>
+          <a:lstStyle/>
+          <a:p>
+            <a:r>
+              <a:rPr lang="en-US" dirty="0"/>
+              <a:t>I combined several methods to try and solve the problem – </a:t>
+            </a:r>
+            <a:r>
+              <a:rPr lang="en-US" b="1" dirty="0"/>
+              <a:t>unique model for each subject</a:t>
+            </a:r>
+          </a:p>
+        </p:txBody>
+      </p:sp>
+      <p:sp>
+        <p:nvSpPr>
+          <p:cNvPr id="4" name="Rectangle 3">
+            <a:extLst>
+              <a:ext uri="{FF2B5EF4-FFF2-40B4-BE49-F238E27FC236}">
+                <a16:creationId xmlns:a16="http://schemas.microsoft.com/office/drawing/2014/main" id="{A06A2A06-0481-46FC-222F-BC9AD944AF87}"/>
+              </a:ext>
+            </a:extLst>
+          </p:cNvPr>
+          <p:cNvSpPr/>
+          <p:nvPr/>
+        </p:nvSpPr>
+        <p:spPr>
+          <a:xfrm>
+            <a:off x="377505" y="1686187"/>
+            <a:ext cx="2474753" cy="645952"/>
+          </a:xfrm>
+          <a:prstGeom prst="rect">
+            <a:avLst/>
+          </a:prstGeom>
+        </p:spPr>
+        <p:style>
+          <a:lnRef idx="2">
+            <a:schemeClr val="accent1">
+              <a:shade val="50000"/>
+            </a:schemeClr>
+          </a:lnRef>
+          <a:fillRef idx="1">
+            <a:schemeClr val="accent1"/>
+          </a:fillRef>
+          <a:effectRef idx="0">
+            <a:schemeClr val="accent1"/>
+          </a:effectRef>
+          <a:fontRef idx="minor">
+            <a:schemeClr val="lt1"/>
+          </a:fontRef>
+        </p:style>
+        <p:txBody>
+          <a:bodyPr rtlCol="0" anchor="ctr"/>
+          <a:lstStyle/>
+          <a:p>
+            <a:pPr algn="ctr"/>
+            <a:r>
+              <a:rPr lang="en-US" dirty="0"/>
+              <a:t>Convolutional Neural Network (big filters)</a:t>
+            </a:r>
+          </a:p>
+        </p:txBody>
+      </p:sp>
+      <p:sp>
+        <p:nvSpPr>
+          <p:cNvPr id="5" name="Rectangle 4">
+            <a:extLst>
+              <a:ext uri="{FF2B5EF4-FFF2-40B4-BE49-F238E27FC236}">
+                <a16:creationId xmlns:a16="http://schemas.microsoft.com/office/drawing/2014/main" id="{6989E271-F6A2-536E-5E64-7C6490DC96AC}"/>
+              </a:ext>
+            </a:extLst>
+          </p:cNvPr>
+          <p:cNvSpPr/>
+          <p:nvPr/>
+        </p:nvSpPr>
+        <p:spPr>
+          <a:xfrm>
+            <a:off x="3366782" y="1686187"/>
+            <a:ext cx="2474753" cy="645952"/>
+          </a:xfrm>
+          <a:prstGeom prst="rect">
+            <a:avLst/>
+          </a:prstGeom>
+        </p:spPr>
+        <p:style>
+          <a:lnRef idx="2">
+            <a:schemeClr val="accent1">
+              <a:shade val="50000"/>
+            </a:schemeClr>
+          </a:lnRef>
+          <a:fillRef idx="1">
+            <a:schemeClr val="accent1"/>
+          </a:fillRef>
+          <a:effectRef idx="0">
+            <a:schemeClr val="accent1"/>
+          </a:effectRef>
+          <a:fontRef idx="minor">
+            <a:schemeClr val="lt1"/>
+          </a:fontRef>
+        </p:style>
+        <p:txBody>
+          <a:bodyPr rtlCol="0" anchor="ctr"/>
+          <a:lstStyle/>
+          <a:p>
+            <a:pPr algn="ctr"/>
+            <a:r>
+              <a:rPr lang="en-US" dirty="0"/>
+              <a:t>Convolutional Neural Network (small filters)</a:t>
+            </a:r>
+          </a:p>
+        </p:txBody>
+      </p:sp>
+      <p:sp>
+        <p:nvSpPr>
+          <p:cNvPr id="6" name="Rectangle 5">
+            <a:extLst>
+              <a:ext uri="{FF2B5EF4-FFF2-40B4-BE49-F238E27FC236}">
+                <a16:creationId xmlns:a16="http://schemas.microsoft.com/office/drawing/2014/main" id="{3B5506A1-B9C5-1D71-CE0D-470251B65E56}"/>
+              </a:ext>
+            </a:extLst>
+          </p:cNvPr>
+          <p:cNvSpPr/>
+          <p:nvPr/>
+        </p:nvSpPr>
+        <p:spPr>
+          <a:xfrm>
+            <a:off x="6356059" y="1686187"/>
+            <a:ext cx="2474753" cy="645952"/>
+          </a:xfrm>
+          <a:prstGeom prst="rect">
+            <a:avLst/>
+          </a:prstGeom>
+        </p:spPr>
+        <p:style>
+          <a:lnRef idx="2">
+            <a:schemeClr val="accent1">
+              <a:shade val="50000"/>
+            </a:schemeClr>
+          </a:lnRef>
+          <a:fillRef idx="1">
+            <a:schemeClr val="accent1"/>
+          </a:fillRef>
+          <a:effectRef idx="0">
+            <a:schemeClr val="accent1"/>
+          </a:effectRef>
+          <a:fontRef idx="minor">
+            <a:schemeClr val="lt1"/>
+          </a:fontRef>
+        </p:style>
+        <p:txBody>
+          <a:bodyPr rtlCol="0" anchor="ctr"/>
+          <a:lstStyle/>
+          <a:p>
+            <a:pPr algn="ctr"/>
+            <a:r>
+              <a:rPr lang="en-US" dirty="0"/>
+              <a:t>LDA + Common Spatial Patterns (CSP)</a:t>
+            </a:r>
+          </a:p>
+        </p:txBody>
+      </p:sp>
+      <p:sp>
+        <p:nvSpPr>
+          <p:cNvPr id="7" name="Rectangle 6">
+            <a:extLst>
+              <a:ext uri="{FF2B5EF4-FFF2-40B4-BE49-F238E27FC236}">
+                <a16:creationId xmlns:a16="http://schemas.microsoft.com/office/drawing/2014/main" id="{537E2423-C766-2DE1-F64C-3FD21312726E}"/>
+              </a:ext>
+            </a:extLst>
+          </p:cNvPr>
+          <p:cNvSpPr/>
+          <p:nvPr/>
+        </p:nvSpPr>
+        <p:spPr>
+          <a:xfrm>
+            <a:off x="9345336" y="1686187"/>
+            <a:ext cx="2474753" cy="645952"/>
+          </a:xfrm>
+          <a:prstGeom prst="rect">
+            <a:avLst/>
+          </a:prstGeom>
+        </p:spPr>
+        <p:style>
+          <a:lnRef idx="2">
+            <a:schemeClr val="accent1">
+              <a:shade val="50000"/>
+            </a:schemeClr>
+          </a:lnRef>
+          <a:fillRef idx="1">
+            <a:schemeClr val="accent1"/>
+          </a:fillRef>
+          <a:effectRef idx="0">
+            <a:schemeClr val="accent1"/>
+          </a:effectRef>
+          <a:fontRef idx="minor">
+            <a:schemeClr val="lt1"/>
+          </a:fontRef>
+        </p:style>
+        <p:txBody>
+          <a:bodyPr rtlCol="0" anchor="ctr"/>
+          <a:lstStyle/>
+          <a:p>
+            <a:pPr algn="ctr"/>
+            <a:r>
+              <a:rPr lang="en-US" dirty="0"/>
+              <a:t>Neural Network + CSP</a:t>
+            </a:r>
+          </a:p>
+        </p:txBody>
+      </p:sp>
+      <p:sp>
+        <p:nvSpPr>
+          <p:cNvPr id="8" name="Rectangle: Rounded Corners 7">
+            <a:extLst>
+              <a:ext uri="{FF2B5EF4-FFF2-40B4-BE49-F238E27FC236}">
+                <a16:creationId xmlns:a16="http://schemas.microsoft.com/office/drawing/2014/main" id="{0752376E-7849-8DE2-FF3F-8980E6E8C19E}"/>
+              </a:ext>
+            </a:extLst>
+          </p:cNvPr>
+          <p:cNvSpPr/>
+          <p:nvPr/>
+        </p:nvSpPr>
+        <p:spPr>
+          <a:xfrm>
+            <a:off x="4472730" y="3465558"/>
+            <a:ext cx="3246539" cy="907821"/>
+          </a:xfrm>
+          <a:prstGeom prst="roundRect">
+            <a:avLst/>
+          </a:prstGeom>
+        </p:spPr>
+        <p:style>
+          <a:lnRef idx="2">
+            <a:schemeClr val="accent1">
+              <a:shade val="50000"/>
+            </a:schemeClr>
+          </a:lnRef>
+          <a:fillRef idx="1">
+            <a:schemeClr val="accent1"/>
+          </a:fillRef>
+          <a:effectRef idx="0">
+            <a:schemeClr val="accent1"/>
+          </a:effectRef>
+          <a:fontRef idx="minor">
+            <a:schemeClr val="lt1"/>
+          </a:fontRef>
+        </p:style>
+        <p:txBody>
+          <a:bodyPr rtlCol="0" anchor="ctr"/>
+          <a:lstStyle/>
+          <a:p>
+            <a:pPr algn="ctr"/>
+            <a:r>
+              <a:rPr lang="en-US" dirty="0"/>
+              <a:t>Neural Network</a:t>
+            </a:r>
+          </a:p>
+        </p:txBody>
+      </p:sp>
+      <p:cxnSp>
+        <p:nvCxnSpPr>
+          <p:cNvPr id="10" name="Straight Arrow Connector 9">
+            <a:extLst>
+              <a:ext uri="{FF2B5EF4-FFF2-40B4-BE49-F238E27FC236}">
+                <a16:creationId xmlns:a16="http://schemas.microsoft.com/office/drawing/2014/main" id="{1831FCB1-A12B-D4E2-60EB-1B239137D9F8}"/>
+              </a:ext>
+            </a:extLst>
+          </p:cNvPr>
+          <p:cNvCxnSpPr>
+            <a:cxnSpLocks/>
+            <a:stCxn id="4" idx="2"/>
+            <a:endCxn id="8" idx="0"/>
+          </p:cNvCxnSpPr>
+          <p:nvPr/>
+        </p:nvCxnSpPr>
+        <p:spPr>
+          <a:xfrm>
+            <a:off x="1614882" y="2332139"/>
+            <a:ext cx="4481118" cy="1133419"/>
+          </a:xfrm>
+          <a:prstGeom prst="straightConnector1">
+            <a:avLst/>
+          </a:prstGeom>
+          <a:ln>
+            <a:solidFill>
+              <a:schemeClr val="tx1"/>
+            </a:solidFill>
+            <a:tailEnd type="triangle"/>
+          </a:ln>
+        </p:spPr>
+        <p:style>
+          <a:lnRef idx="1">
+            <a:schemeClr val="accent1"/>
+          </a:lnRef>
+          <a:fillRef idx="0">
+            <a:schemeClr val="accent1"/>
+          </a:fillRef>
+          <a:effectRef idx="0">
+            <a:schemeClr val="accent1"/>
+          </a:effectRef>
+          <a:fontRef idx="minor">
+            <a:schemeClr val="tx1"/>
+          </a:fontRef>
+        </p:style>
+      </p:cxnSp>
+      <p:cxnSp>
+        <p:nvCxnSpPr>
+          <p:cNvPr id="11" name="Straight Arrow Connector 10">
+            <a:extLst>
+              <a:ext uri="{FF2B5EF4-FFF2-40B4-BE49-F238E27FC236}">
+                <a16:creationId xmlns:a16="http://schemas.microsoft.com/office/drawing/2014/main" id="{244EABB5-8591-A018-70EA-832E81B0D82B}"/>
+              </a:ext>
+            </a:extLst>
+          </p:cNvPr>
+          <p:cNvCxnSpPr>
+            <a:cxnSpLocks/>
+            <a:stCxn id="6" idx="2"/>
+            <a:endCxn id="8" idx="0"/>
+          </p:cNvCxnSpPr>
+          <p:nvPr/>
+        </p:nvCxnSpPr>
+        <p:spPr>
+          <a:xfrm flipH="1">
+            <a:off x="6096000" y="2332139"/>
+            <a:ext cx="1497436" cy="1133419"/>
+          </a:xfrm>
+          <a:prstGeom prst="straightConnector1">
+            <a:avLst/>
+          </a:prstGeom>
+          <a:ln>
+            <a:solidFill>
+              <a:schemeClr val="tx1"/>
+            </a:solidFill>
+            <a:tailEnd type="triangle"/>
+          </a:ln>
+        </p:spPr>
+        <p:style>
+          <a:lnRef idx="1">
+            <a:schemeClr val="accent1"/>
+          </a:lnRef>
+          <a:fillRef idx="0">
+            <a:schemeClr val="accent1"/>
+          </a:fillRef>
+          <a:effectRef idx="0">
+            <a:schemeClr val="accent1"/>
+          </a:effectRef>
+          <a:fontRef idx="minor">
+            <a:schemeClr val="tx1"/>
+          </a:fontRef>
+        </p:style>
+      </p:cxnSp>
+      <p:cxnSp>
+        <p:nvCxnSpPr>
+          <p:cNvPr id="12" name="Straight Arrow Connector 11">
+            <a:extLst>
+              <a:ext uri="{FF2B5EF4-FFF2-40B4-BE49-F238E27FC236}">
+                <a16:creationId xmlns:a16="http://schemas.microsoft.com/office/drawing/2014/main" id="{17D11D63-4149-16FD-3269-F1A2661204BD}"/>
+              </a:ext>
+            </a:extLst>
+          </p:cNvPr>
+          <p:cNvCxnSpPr>
+            <a:cxnSpLocks/>
+            <a:stCxn id="5" idx="2"/>
+            <a:endCxn id="8" idx="0"/>
+          </p:cNvCxnSpPr>
+          <p:nvPr/>
+        </p:nvCxnSpPr>
+        <p:spPr>
+          <a:xfrm>
+            <a:off x="4604159" y="2332139"/>
+            <a:ext cx="1491841" cy="1133419"/>
+          </a:xfrm>
+          <a:prstGeom prst="straightConnector1">
+            <a:avLst/>
+          </a:prstGeom>
+          <a:ln>
+            <a:solidFill>
+              <a:schemeClr val="tx1"/>
+            </a:solidFill>
+            <a:tailEnd type="triangle"/>
+          </a:ln>
+        </p:spPr>
+        <p:style>
+          <a:lnRef idx="1">
+            <a:schemeClr val="accent1"/>
+          </a:lnRef>
+          <a:fillRef idx="0">
+            <a:schemeClr val="accent1"/>
+          </a:fillRef>
+          <a:effectRef idx="0">
+            <a:schemeClr val="accent1"/>
+          </a:effectRef>
+          <a:fontRef idx="minor">
+            <a:schemeClr val="tx1"/>
+          </a:fontRef>
+        </p:style>
+      </p:cxnSp>
+      <p:cxnSp>
+        <p:nvCxnSpPr>
+          <p:cNvPr id="13" name="Straight Arrow Connector 12">
+            <a:extLst>
+              <a:ext uri="{FF2B5EF4-FFF2-40B4-BE49-F238E27FC236}">
+                <a16:creationId xmlns:a16="http://schemas.microsoft.com/office/drawing/2014/main" id="{BEFB6A13-85C6-DD79-710A-7AB5D159259F}"/>
+              </a:ext>
+            </a:extLst>
+          </p:cNvPr>
+          <p:cNvCxnSpPr>
+            <a:cxnSpLocks/>
+            <a:stCxn id="7" idx="2"/>
+            <a:endCxn id="8" idx="0"/>
+          </p:cNvCxnSpPr>
+          <p:nvPr/>
+        </p:nvCxnSpPr>
+        <p:spPr>
+          <a:xfrm flipH="1">
+            <a:off x="6096000" y="2332139"/>
+            <a:ext cx="4486713" cy="1133419"/>
+          </a:xfrm>
+          <a:prstGeom prst="straightConnector1">
+            <a:avLst/>
+          </a:prstGeom>
+          <a:ln>
+            <a:solidFill>
+              <a:schemeClr val="tx1"/>
+            </a:solidFill>
+            <a:tailEnd type="triangle"/>
+          </a:ln>
+        </p:spPr>
+        <p:style>
+          <a:lnRef idx="1">
+            <a:schemeClr val="accent1"/>
+          </a:lnRef>
+          <a:fillRef idx="0">
+            <a:schemeClr val="accent1"/>
+          </a:fillRef>
+          <a:effectRef idx="0">
+            <a:schemeClr val="accent1"/>
+          </a:effectRef>
+          <a:fontRef idx="minor">
+            <a:schemeClr val="tx1"/>
+          </a:fontRef>
+        </p:style>
+      </p:cxnSp>
+      <p:sp>
+        <p:nvSpPr>
+          <p:cNvPr id="20" name="Arrow: Down 19">
+            <a:extLst>
+              <a:ext uri="{FF2B5EF4-FFF2-40B4-BE49-F238E27FC236}">
+                <a16:creationId xmlns:a16="http://schemas.microsoft.com/office/drawing/2014/main" id="{3B7005A1-3A0B-E7F6-9C14-20D0FB4BFE58}"/>
+              </a:ext>
+            </a:extLst>
+          </p:cNvPr>
+          <p:cNvSpPr/>
+          <p:nvPr/>
+        </p:nvSpPr>
+        <p:spPr>
+          <a:xfrm>
+            <a:off x="5728003" y="4638978"/>
+            <a:ext cx="796954" cy="385893"/>
+          </a:xfrm>
+          <a:prstGeom prst="downArrow">
+            <a:avLst/>
+          </a:prstGeom>
+        </p:spPr>
+        <p:style>
+          <a:lnRef idx="2">
+            <a:schemeClr val="accent1">
+              <a:shade val="50000"/>
+            </a:schemeClr>
+          </a:lnRef>
+          <a:fillRef idx="1">
+            <a:schemeClr val="accent1"/>
+          </a:fillRef>
+          <a:effectRef idx="0">
+            <a:schemeClr val="accent1"/>
+          </a:effectRef>
+          <a:fontRef idx="minor">
+            <a:schemeClr val="lt1"/>
+          </a:fontRef>
+        </p:style>
+        <p:txBody>
+          <a:bodyPr rtlCol="0" anchor="ctr"/>
+          <a:lstStyle/>
+          <a:p>
+            <a:pPr algn="ctr"/>
+            <a:endParaRPr lang="en-US"/>
+          </a:p>
+        </p:txBody>
+      </p:sp>
+      <p:sp>
+        <p:nvSpPr>
+          <p:cNvPr id="34" name="Rectangle: Rounded Corners 33">
+            <a:extLst>
+              <a:ext uri="{FF2B5EF4-FFF2-40B4-BE49-F238E27FC236}">
+                <a16:creationId xmlns:a16="http://schemas.microsoft.com/office/drawing/2014/main" id="{454E6CD6-6884-E1BE-A4E9-54E00A2985D4}"/>
+              </a:ext>
+            </a:extLst>
+          </p:cNvPr>
+          <p:cNvSpPr/>
+          <p:nvPr/>
+        </p:nvSpPr>
+        <p:spPr>
+          <a:xfrm>
+            <a:off x="4472730" y="5290470"/>
+            <a:ext cx="3246539" cy="907821"/>
+          </a:xfrm>
+          <a:prstGeom prst="roundRect">
+            <a:avLst/>
+          </a:prstGeom>
+          <a:noFill/>
+          <a:ln>
+            <a:solidFill>
+              <a:schemeClr val="tx1"/>
+            </a:solidFill>
+          </a:ln>
+        </p:spPr>
+        <p:style>
+          <a:lnRef idx="2">
+            <a:schemeClr val="accent1">
+              <a:shade val="50000"/>
+            </a:schemeClr>
+          </a:lnRef>
+          <a:fillRef idx="1">
+            <a:schemeClr val="accent1"/>
+          </a:fillRef>
+          <a:effectRef idx="0">
+            <a:schemeClr val="accent1"/>
+          </a:effectRef>
+          <a:fontRef idx="minor">
+            <a:schemeClr val="lt1"/>
+          </a:fontRef>
+        </p:style>
+        <p:txBody>
+          <a:bodyPr rtlCol="0" anchor="ctr"/>
+          <a:lstStyle/>
+          <a:p>
+            <a:pPr algn="ctr"/>
+            <a:r>
+              <a:rPr lang="en-US" sz="2400" b="1" dirty="0">
+                <a:solidFill>
+                  <a:schemeClr val="tx1"/>
+                </a:solidFill>
+              </a:rPr>
+              <a:t>Final prediction for each trial</a:t>
+            </a:r>
+          </a:p>
+        </p:txBody>
+      </p:sp>
+    </p:spTree>
+    <p:extLst>
+      <p:ext uri="{BB962C8B-B14F-4D97-AF65-F5344CB8AC3E}">
+        <p14:creationId xmlns:p14="http://schemas.microsoft.com/office/powerpoint/2010/main" val="442744482"/>
+      </p:ext>
+    </p:extLst>
+  </p:cSld>
+  <p:clrMapOvr>
+    <a:masterClrMapping/>
+  </p:clrMapOvr>
+</p:sld>
+</file>
+
+<file path=ppt/slides/slide11.xml><?xml version="1.0" encoding="utf-8"?>
+<p:sld xmlns:a="http://schemas.openxmlformats.org/drawingml/2006/main" xmlns:r="http://schemas.openxmlformats.org/officeDocument/2006/relationships" xmlns:p="http://schemas.openxmlformats.org/presentationml/2006/main">
+  <p:cSld>
+    <p:spTree>
+      <p:nvGrpSpPr>
+        <p:cNvPr id="1" name=""/>
+        <p:cNvGrpSpPr/>
+        <p:nvPr/>
+      </p:nvGrpSpPr>
+      <p:grpSpPr>
+        <a:xfrm>
+          <a:off x="0" y="0"/>
+          <a:ext cx="0" cy="0"/>
+          <a:chOff x="0" y="0"/>
+          <a:chExt cx="0" cy="0"/>
+        </a:xfrm>
+      </p:grpSpPr>
+      <p:sp>
+        <p:nvSpPr>
+          <p:cNvPr id="2" name="Title 1">
+            <a:extLst>
+              <a:ext uri="{FF2B5EF4-FFF2-40B4-BE49-F238E27FC236}">
+                <a16:creationId xmlns:a16="http://schemas.microsoft.com/office/drawing/2014/main" id="{3E26E113-3C10-B170-4384-8FA3A4338117}"/>
+              </a:ext>
+            </a:extLst>
+          </p:cNvPr>
+          <p:cNvSpPr>
+            <a:spLocks noGrp="1"/>
+          </p:cNvSpPr>
+          <p:nvPr>
+            <p:ph type="title"/>
+          </p:nvPr>
+        </p:nvSpPr>
+        <p:spPr/>
+        <p:txBody>
+          <a:bodyPr>
+            <a:normAutofit fontScale="90000"/>
+          </a:bodyPr>
+          <a:lstStyle/>
+          <a:p>
+            <a:r>
+              <a:rPr lang="en-US" dirty="0"/>
+              <a:t>The original study achieved 80% average accuracy across the nine subjects</a:t>
+            </a:r>
+          </a:p>
+        </p:txBody>
+      </p:sp>
+      <p:pic>
+        <p:nvPicPr>
+          <p:cNvPr id="5" name="Picture 4">
+            <a:extLst>
+              <a:ext uri="{FF2B5EF4-FFF2-40B4-BE49-F238E27FC236}">
+                <a16:creationId xmlns:a16="http://schemas.microsoft.com/office/drawing/2014/main" id="{A2009750-1979-EAC8-1FA9-CA30927C80C7}"/>
+              </a:ext>
+            </a:extLst>
+          </p:cNvPr>
+          <p:cNvPicPr>
+            <a:picLocks noChangeAspect="1"/>
+          </p:cNvPicPr>
+          <p:nvPr/>
+        </p:nvPicPr>
+        <p:blipFill rotWithShape="1">
+          <a:blip r:embed="rId2"/>
+          <a:srcRect t="584" b="-1"/>
+          <a:stretch/>
+        </p:blipFill>
+        <p:spPr>
+          <a:xfrm>
+            <a:off x="1885339" y="1761687"/>
+            <a:ext cx="7867650" cy="3759359"/>
+          </a:xfrm>
+          <a:prstGeom prst="rect">
+            <a:avLst/>
+          </a:prstGeom>
+        </p:spPr>
+      </p:pic>
+      <p:sp>
+        <p:nvSpPr>
+          <p:cNvPr id="6" name="TextBox 5">
+            <a:extLst>
+              <a:ext uri="{FF2B5EF4-FFF2-40B4-BE49-F238E27FC236}">
+                <a16:creationId xmlns:a16="http://schemas.microsoft.com/office/drawing/2014/main" id="{6310D4D4-7C04-3ED8-4B3C-57CF034CC350}"/>
+              </a:ext>
+            </a:extLst>
+          </p:cNvPr>
+          <p:cNvSpPr txBox="1"/>
+          <p:nvPr/>
+        </p:nvSpPr>
+        <p:spPr>
+          <a:xfrm>
+            <a:off x="188093" y="5747550"/>
+            <a:ext cx="11081752" cy="1107996"/>
+          </a:xfrm>
+          <a:prstGeom prst="rect">
+            <a:avLst/>
+          </a:prstGeom>
+          <a:noFill/>
+        </p:spPr>
+        <p:txBody>
+          <a:bodyPr wrap="none" rtlCol="0">
+            <a:spAutoFit/>
+          </a:bodyPr>
+          <a:lstStyle/>
+          <a:p>
+            <a:r>
+              <a:rPr lang="en-US" sz="1600" dirty="0"/>
+              <a:t>Source: Reinhold Scherer, Josef Faller, Elisabeth V. C. Friedrich, Eloy </a:t>
+            </a:r>
+            <a:r>
+              <a:rPr lang="en-US" sz="1600" dirty="0" err="1"/>
+              <a:t>Opisso</a:t>
+            </a:r>
+            <a:r>
+              <a:rPr lang="en-US" sz="1600" dirty="0"/>
+              <a:t>, Ursula Costa, Andrea Kübler, and Gernot R. Müller-Putz:</a:t>
+            </a:r>
+          </a:p>
+          <a:p>
+            <a:r>
+              <a:rPr lang="en-US" sz="1600" b="0" i="1" dirty="0">
+                <a:solidFill>
+                  <a:srgbClr val="000000"/>
+                </a:solidFill>
+                <a:effectLst/>
+                <a:latin typeface="Cambria" panose="02040503050406030204" pitchFamily="18" charset="0"/>
+              </a:rPr>
+              <a:t>Individually Adapted Imagery Improves Brain-Computer Interface Performance in End-Users with Disability</a:t>
+            </a:r>
+          </a:p>
+          <a:p>
+            <a:endParaRPr lang="en-US" sz="1600" dirty="0"/>
+          </a:p>
+          <a:p>
+            <a:endParaRPr lang="en-US" sz="1600" dirty="0"/>
+          </a:p>
+        </p:txBody>
+      </p:sp>
+    </p:spTree>
+    <p:extLst>
+      <p:ext uri="{BB962C8B-B14F-4D97-AF65-F5344CB8AC3E}">
+        <p14:creationId xmlns:p14="http://schemas.microsoft.com/office/powerpoint/2010/main" val="3392253816"/>
+      </p:ext>
+    </p:extLst>
+  </p:cSld>
+  <p:clrMapOvr>
+    <a:masterClrMapping/>
+  </p:clrMapOvr>
+</p:sld>
+</file>
+
+<file path=ppt/slides/slide12.xml><?xml version="1.0" encoding="utf-8"?>
 <p:sld xmlns:a="http://schemas.openxmlformats.org/drawingml/2006/main" xmlns:r="http://schemas.openxmlformats.org/officeDocument/2006/relationships" xmlns:p="http://schemas.openxmlformats.org/presentationml/2006/main">
   <p:cSld>
     <p:spTree>
@@ -4406,7 +5156,7 @@
 </p:sld>
 </file>
 
-<file path=ppt/slides/slide11.xml><?xml version="1.0" encoding="utf-8"?>
+<file path=ppt/slides/slide13.xml><?xml version="1.0" encoding="utf-8"?>
 <p:sld xmlns:a="http://schemas.openxmlformats.org/drawingml/2006/main" xmlns:r="http://schemas.openxmlformats.org/officeDocument/2006/relationships" xmlns:p="http://schemas.openxmlformats.org/presentationml/2006/main">
   <p:cSld>
     <p:spTree>
@@ -4465,8 +5215,8 @@
         </p:nvSpPr>
         <p:spPr>
           <a:xfrm>
-            <a:off x="1097280" y="1837189"/>
-            <a:ext cx="9479559" cy="4154984"/>
+            <a:off x="1097280" y="1585519"/>
+            <a:ext cx="9479559" cy="4524315"/>
           </a:xfrm>
           <a:prstGeom prst="rect">
             <a:avLst/>
@@ -4485,6 +5235,24 @@
             </a:pPr>
             <a:r>
               <a:rPr lang="en-US" sz="2400" dirty="0"/>
+              <a:t>Use </a:t>
+            </a:r>
+            <a:r>
+              <a:rPr lang="en-US" sz="2400" b="1" dirty="0"/>
+              <a:t>different ensemble model </a:t>
+            </a:r>
+            <a:r>
+              <a:rPr lang="en-US" sz="2400" dirty="0"/>
+              <a:t>– neural network is overfitting</a:t>
+            </a:r>
+          </a:p>
+          <a:p>
+            <a:pPr marL="342900" indent="-342900">
+              <a:buFont typeface="+mj-lt"/>
+              <a:buAutoNum type="arabicPeriod"/>
+            </a:pPr>
+            <a:r>
+              <a:rPr lang="en-US" sz="2400" dirty="0"/>
               <a:t>Utilize a </a:t>
             </a:r>
             <a:r>
@@ -4493,7 +5261,7 @@
             </a:r>
             <a:r>
               <a:rPr lang="en-US" sz="2400" dirty="0"/>
-              <a:t>method </a:t>
+              <a:t>method for a new L1 model</a:t>
             </a:r>
           </a:p>
           <a:p>
@@ -4531,7 +5299,7 @@
             </a:pPr>
             <a:r>
               <a:rPr lang="en-US" sz="2400" dirty="0"/>
-              <a:t>Essentially using the first few trials of session 2 to adjust the models to the shifted EEG patterns</a:t>
+              <a:t>Essentially using the first few trials of session 2 to adjust the model to the shifted EEG patterns</a:t>
             </a:r>
           </a:p>
           <a:p>
@@ -4673,7 +5441,7 @@
         </p:spPr>
         <p:txBody>
           <a:bodyPr>
-            <a:normAutofit fontScale="92500" lnSpcReduction="20000"/>
+            <a:normAutofit fontScale="92500" lnSpcReduction="10000"/>
           </a:bodyPr>
           <a:lstStyle/>
           <a:p>
@@ -4711,7 +5479,7 @@
             </a:pPr>
             <a:r>
               <a:rPr lang="en-US" sz="2800" dirty="0"/>
-              <a:t>At each session they wore an array of thirty EEG electrodes and were asked to think about five different mental tasks forty times per task, for a total of 200 trials per session.</a:t>
+              <a:t>At each session they wore an array of thirty EEG electrodes</a:t>
             </a:r>
           </a:p>
           <a:p>
@@ -4720,15 +5488,15 @@
               <a:buChar char="•"/>
             </a:pPr>
             <a:r>
-              <a:rPr lang="en-US" sz="3000" dirty="0"/>
+              <a:rPr lang="en-US" sz="3200" dirty="0"/>
               <a:t>And most importantly for our purposes – </a:t>
             </a:r>
             <a:r>
-              <a:rPr lang="en-US" sz="3000" b="1" dirty="0"/>
+              <a:rPr lang="en-US" sz="3200" b="1" dirty="0"/>
               <a:t>they released the raw data </a:t>
             </a:r>
             <a:r>
-              <a:rPr lang="en-US" sz="3000" dirty="0"/>
+              <a:rPr lang="en-US" sz="3200" dirty="0"/>
               <a:t>so we can use it to try and replicate and improve on their results</a:t>
             </a:r>
           </a:p>
@@ -5038,6 +5806,1050 @@
           <p:cNvPr id="2" name="Title 1">
             <a:extLst>
               <a:ext uri="{FF2B5EF4-FFF2-40B4-BE49-F238E27FC236}">
+                <a16:creationId xmlns:a16="http://schemas.microsoft.com/office/drawing/2014/main" id="{9A1AC968-99D5-9FF6-5C4F-3748336C84D7}"/>
+              </a:ext>
+            </a:extLst>
+          </p:cNvPr>
+          <p:cNvSpPr>
+            <a:spLocks noGrp="1"/>
+          </p:cNvSpPr>
+          <p:nvPr>
+            <p:ph type="title"/>
+          </p:nvPr>
+        </p:nvSpPr>
+        <p:spPr/>
+        <p:txBody>
+          <a:bodyPr>
+            <a:normAutofit fontScale="90000"/>
+          </a:bodyPr>
+          <a:lstStyle/>
+          <a:p>
+            <a:r>
+              <a:rPr lang="en-US" dirty="0"/>
+              <a:t>Finding a yes/no predictor against 50% baseline accuracy</a:t>
+            </a:r>
+          </a:p>
+        </p:txBody>
+      </p:sp>
+      <p:pic>
+        <p:nvPicPr>
+          <p:cNvPr id="3076" name="Picture 4">
+            <a:extLst>
+              <a:ext uri="{FF2B5EF4-FFF2-40B4-BE49-F238E27FC236}">
+                <a16:creationId xmlns:a16="http://schemas.microsoft.com/office/drawing/2014/main" id="{E321AC7F-C589-5111-E16B-FD885335399F}"/>
+              </a:ext>
+            </a:extLst>
+          </p:cNvPr>
+          <p:cNvPicPr>
+            <a:picLocks noChangeAspect="1" noChangeArrowheads="1"/>
+          </p:cNvPicPr>
+          <p:nvPr/>
+        </p:nvPicPr>
+        <p:blipFill>
+          <a:blip r:embed="rId2">
+            <a:extLst>
+              <a:ext uri="{28A0092B-C50C-407E-A947-70E740481C1C}">
+                <a14:useLocalDpi xmlns:a14="http://schemas.microsoft.com/office/drawing/2010/main" val="0"/>
+              </a:ext>
+            </a:extLst>
+          </a:blip>
+          <a:srcRect/>
+          <a:stretch>
+            <a:fillRect/>
+          </a:stretch>
+        </p:blipFill>
+        <p:spPr bwMode="auto">
+          <a:xfrm>
+            <a:off x="2395537" y="1529155"/>
+            <a:ext cx="7400925" cy="4286250"/>
+          </a:xfrm>
+          <a:prstGeom prst="rect">
+            <a:avLst/>
+          </a:prstGeom>
+          <a:noFill/>
+          <a:extLst>
+            <a:ext uri="{909E8E84-426E-40DD-AFC4-6F175D3DCCD1}">
+              <a14:hiddenFill xmlns:a14="http://schemas.microsoft.com/office/drawing/2010/main">
+                <a:solidFill>
+                  <a:srgbClr val="FFFFFF"/>
+                </a:solidFill>
+              </a14:hiddenFill>
+            </a:ext>
+          </a:extLst>
+        </p:spPr>
+      </p:pic>
+      <p:sp>
+        <p:nvSpPr>
+          <p:cNvPr id="5" name="TextBox 4">
+            <a:extLst>
+              <a:ext uri="{FF2B5EF4-FFF2-40B4-BE49-F238E27FC236}">
+                <a16:creationId xmlns:a16="http://schemas.microsoft.com/office/drawing/2014/main" id="{F712598C-1F9A-E973-0762-740D66B38965}"/>
+              </a:ext>
+            </a:extLst>
+          </p:cNvPr>
+          <p:cNvSpPr txBox="1"/>
+          <p:nvPr/>
+        </p:nvSpPr>
+        <p:spPr>
+          <a:xfrm>
+            <a:off x="188093" y="5781106"/>
+            <a:ext cx="11081752" cy="1107996"/>
+          </a:xfrm>
+          <a:prstGeom prst="rect">
+            <a:avLst/>
+          </a:prstGeom>
+          <a:noFill/>
+        </p:spPr>
+        <p:txBody>
+          <a:bodyPr wrap="none" rtlCol="0">
+            <a:spAutoFit/>
+          </a:bodyPr>
+          <a:lstStyle/>
+          <a:p>
+            <a:r>
+              <a:rPr lang="en-US" sz="1600" dirty="0"/>
+              <a:t>Source: Reinhold Scherer, Josef Faller, Elisabeth V. C. Friedrich, Eloy </a:t>
+            </a:r>
+            <a:r>
+              <a:rPr lang="en-US" sz="1600" dirty="0" err="1"/>
+              <a:t>Opisso</a:t>
+            </a:r>
+            <a:r>
+              <a:rPr lang="en-US" sz="1600" dirty="0"/>
+              <a:t>, Ursula Costa, Andrea Kübler, and Gernot R. Müller-Putz:</a:t>
+            </a:r>
+          </a:p>
+          <a:p>
+            <a:r>
+              <a:rPr lang="en-US" sz="1600" b="0" i="1" dirty="0">
+                <a:solidFill>
+                  <a:srgbClr val="000000"/>
+                </a:solidFill>
+                <a:effectLst/>
+                <a:latin typeface="Cambria" panose="02040503050406030204" pitchFamily="18" charset="0"/>
+              </a:rPr>
+              <a:t>Individually Adapted Imagery Improves Brain-Computer Interface Performance in End-Users with Disability</a:t>
+            </a:r>
+          </a:p>
+          <a:p>
+            <a:endParaRPr lang="en-US" sz="1600" dirty="0"/>
+          </a:p>
+          <a:p>
+            <a:endParaRPr lang="en-US" sz="1600" dirty="0"/>
+          </a:p>
+        </p:txBody>
+      </p:sp>
+      <p:sp>
+        <p:nvSpPr>
+          <p:cNvPr id="3" name="Arrow: Curved Up 2">
+            <a:extLst>
+              <a:ext uri="{FF2B5EF4-FFF2-40B4-BE49-F238E27FC236}">
+                <a16:creationId xmlns:a16="http://schemas.microsoft.com/office/drawing/2014/main" id="{40175158-FF71-24EF-1C44-C7B06341A75A}"/>
+              </a:ext>
+            </a:extLst>
+          </p:cNvPr>
+          <p:cNvSpPr/>
+          <p:nvPr/>
+        </p:nvSpPr>
+        <p:spPr>
+          <a:xfrm>
+            <a:off x="3045202" y="3242345"/>
+            <a:ext cx="4202885" cy="1740716"/>
+          </a:xfrm>
+          <a:prstGeom prst="curvedUpArrow">
+            <a:avLst/>
+          </a:prstGeom>
+          <a:solidFill>
+            <a:srgbClr val="00B050"/>
+          </a:solidFill>
+          <a:ln>
+            <a:noFill/>
+          </a:ln>
+        </p:spPr>
+        <p:style>
+          <a:lnRef idx="2">
+            <a:schemeClr val="accent1">
+              <a:shade val="50000"/>
+            </a:schemeClr>
+          </a:lnRef>
+          <a:fillRef idx="1">
+            <a:schemeClr val="accent1"/>
+          </a:fillRef>
+          <a:effectRef idx="0">
+            <a:schemeClr val="accent1"/>
+          </a:effectRef>
+          <a:fontRef idx="minor">
+            <a:schemeClr val="lt1"/>
+          </a:fontRef>
+        </p:style>
+        <p:txBody>
+          <a:bodyPr rtlCol="0" anchor="ctr"/>
+          <a:lstStyle/>
+          <a:p>
+            <a:pPr algn="ctr"/>
+            <a:endParaRPr lang="en-US">
+              <a:solidFill>
+                <a:schemeClr val="tx1"/>
+              </a:solidFill>
+            </a:endParaRPr>
+          </a:p>
+        </p:txBody>
+      </p:sp>
+      <p:sp>
+        <p:nvSpPr>
+          <p:cNvPr id="6" name="TextBox 5">
+            <a:extLst>
+              <a:ext uri="{FF2B5EF4-FFF2-40B4-BE49-F238E27FC236}">
+                <a16:creationId xmlns:a16="http://schemas.microsoft.com/office/drawing/2014/main" id="{8FA6F11F-B6F8-FC10-4DFA-0BD5DE87B902}"/>
+              </a:ext>
+            </a:extLst>
+          </p:cNvPr>
+          <p:cNvSpPr txBox="1"/>
+          <p:nvPr/>
+        </p:nvSpPr>
+        <p:spPr>
+          <a:xfrm>
+            <a:off x="4832058" y="4983061"/>
+            <a:ext cx="421910" cy="707886"/>
+          </a:xfrm>
+          <a:prstGeom prst="rect">
+            <a:avLst/>
+          </a:prstGeom>
+          <a:noFill/>
+          <a:ln w="57150">
+            <a:solidFill>
+              <a:srgbClr val="00B050"/>
+            </a:solidFill>
+          </a:ln>
+        </p:spPr>
+        <p:txBody>
+          <a:bodyPr wrap="none" rtlCol="0">
+            <a:spAutoFit/>
+          </a:bodyPr>
+          <a:lstStyle/>
+          <a:p>
+            <a:r>
+              <a:rPr lang="en-US" sz="4000" b="1" dirty="0">
+                <a:solidFill>
+                  <a:srgbClr val="00B050"/>
+                </a:solidFill>
+              </a:rPr>
+              <a:t>?</a:t>
+            </a:r>
+            <a:endParaRPr lang="en-US" b="1" dirty="0">
+              <a:solidFill>
+                <a:srgbClr val="00B050"/>
+              </a:solidFill>
+            </a:endParaRPr>
+          </a:p>
+        </p:txBody>
+      </p:sp>
+    </p:spTree>
+    <p:extLst>
+      <p:ext uri="{BB962C8B-B14F-4D97-AF65-F5344CB8AC3E}">
+        <p14:creationId xmlns:p14="http://schemas.microsoft.com/office/powerpoint/2010/main" val="2245280523"/>
+      </p:ext>
+    </p:extLst>
+  </p:cSld>
+  <p:clrMapOvr>
+    <a:masterClrMapping/>
+  </p:clrMapOvr>
+</p:sld>
+</file>
+
+<file path=ppt/slides/slide5.xml><?xml version="1.0" encoding="utf-8"?>
+<p:sld xmlns:a="http://schemas.openxmlformats.org/drawingml/2006/main" xmlns:r="http://schemas.openxmlformats.org/officeDocument/2006/relationships" xmlns:p="http://schemas.openxmlformats.org/presentationml/2006/main">
+  <p:cSld>
+    <p:spTree>
+      <p:nvGrpSpPr>
+        <p:cNvPr id="1" name=""/>
+        <p:cNvGrpSpPr/>
+        <p:nvPr/>
+      </p:nvGrpSpPr>
+      <p:grpSpPr>
+        <a:xfrm>
+          <a:off x="0" y="0"/>
+          <a:ext cx="0" cy="0"/>
+          <a:chOff x="0" y="0"/>
+          <a:chExt cx="0" cy="0"/>
+        </a:xfrm>
+      </p:grpSpPr>
+      <p:sp>
+        <p:nvSpPr>
+          <p:cNvPr id="2" name="Title 1">
+            <a:extLst>
+              <a:ext uri="{FF2B5EF4-FFF2-40B4-BE49-F238E27FC236}">
+                <a16:creationId xmlns:a16="http://schemas.microsoft.com/office/drawing/2014/main" id="{7100EB50-5999-0336-35AC-55C9E3E1FC15}"/>
+              </a:ext>
+            </a:extLst>
+          </p:cNvPr>
+          <p:cNvSpPr>
+            <a:spLocks noGrp="1"/>
+          </p:cNvSpPr>
+          <p:nvPr>
+            <p:ph type="title"/>
+          </p:nvPr>
+        </p:nvSpPr>
+        <p:spPr/>
+        <p:txBody>
+          <a:bodyPr>
+            <a:normAutofit fontScale="90000"/>
+          </a:bodyPr>
+          <a:lstStyle/>
+          <a:p>
+            <a:r>
+              <a:rPr lang="en-US" dirty="0"/>
+              <a:t>200 trials conducted each day, 80 data points in each pairwise combination</a:t>
+            </a:r>
+          </a:p>
+        </p:txBody>
+      </p:sp>
+      <p:graphicFrame>
+        <p:nvGraphicFramePr>
+          <p:cNvPr id="7" name="Table 7">
+            <a:extLst>
+              <a:ext uri="{FF2B5EF4-FFF2-40B4-BE49-F238E27FC236}">
+                <a16:creationId xmlns:a16="http://schemas.microsoft.com/office/drawing/2014/main" id="{B0E12CB8-F743-C559-ADB0-9E6897E15B63}"/>
+              </a:ext>
+            </a:extLst>
+          </p:cNvPr>
+          <p:cNvGraphicFramePr>
+            <a:graphicFrameLocks noGrp="1"/>
+          </p:cNvGraphicFramePr>
+          <p:nvPr>
+            <p:extLst>
+              <p:ext uri="{D42A27DB-BD31-4B8C-83A1-F6EECF244321}">
+                <p14:modId xmlns:p14="http://schemas.microsoft.com/office/powerpoint/2010/main" val="265815739"/>
+              </p:ext>
+            </p:extLst>
+          </p:nvPr>
+        </p:nvGraphicFramePr>
+        <p:xfrm>
+          <a:off x="946278" y="2174492"/>
+          <a:ext cx="5362244" cy="2595880"/>
+        </p:xfrm>
+        <a:graphic>
+          <a:graphicData uri="http://schemas.openxmlformats.org/drawingml/2006/table">
+            <a:tbl>
+              <a:tblPr firstRow="1" bandRow="1">
+                <a:tableStyleId>{5C22544A-7EE6-4342-B048-85BDC9FD1C3A}</a:tableStyleId>
+              </a:tblPr>
+              <a:tblGrid>
+                <a:gridCol w="2681122">
+                  <a:extLst>
+                    <a:ext uri="{9D8B030D-6E8A-4147-A177-3AD203B41FA5}">
+                      <a16:colId xmlns:a16="http://schemas.microsoft.com/office/drawing/2014/main" val="1899868068"/>
+                    </a:ext>
+                  </a:extLst>
+                </a:gridCol>
+                <a:gridCol w="2681122">
+                  <a:extLst>
+                    <a:ext uri="{9D8B030D-6E8A-4147-A177-3AD203B41FA5}">
+                      <a16:colId xmlns:a16="http://schemas.microsoft.com/office/drawing/2014/main" val="3001704415"/>
+                    </a:ext>
+                  </a:extLst>
+                </a:gridCol>
+              </a:tblGrid>
+              <a:tr h="370840">
+                <a:tc>
+                  <a:txBody>
+                    <a:bodyPr/>
+                    <a:lstStyle/>
+                    <a:p>
+                      <a:pPr algn="ctr"/>
+                      <a:r>
+                        <a:rPr lang="en-US" dirty="0"/>
+                        <a:t>Trial type</a:t>
+                      </a:r>
+                    </a:p>
+                  </a:txBody>
+                  <a:tcPr/>
+                </a:tc>
+                <a:tc>
+                  <a:txBody>
+                    <a:bodyPr/>
+                    <a:lstStyle/>
+                    <a:p>
+                      <a:pPr algn="ctr"/>
+                      <a:r>
+                        <a:rPr lang="en-US" dirty="0"/>
+                        <a:t>Times conducted</a:t>
+                      </a:r>
+                    </a:p>
+                  </a:txBody>
+                  <a:tcPr/>
+                </a:tc>
+                <a:extLst>
+                  <a:ext uri="{0D108BD9-81ED-4DB2-BD59-A6C34878D82A}">
+                    <a16:rowId xmlns:a16="http://schemas.microsoft.com/office/drawing/2014/main" val="3069451808"/>
+                  </a:ext>
+                </a:extLst>
+              </a:tr>
+              <a:tr h="370840">
+                <a:tc>
+                  <a:txBody>
+                    <a:bodyPr/>
+                    <a:lstStyle/>
+                    <a:p>
+                      <a:pPr algn="ctr"/>
+                      <a:r>
+                        <a:rPr lang="en-US" dirty="0"/>
+                        <a:t>Word</a:t>
+                      </a:r>
+                    </a:p>
+                  </a:txBody>
+                  <a:tcPr/>
+                </a:tc>
+                <a:tc>
+                  <a:txBody>
+                    <a:bodyPr/>
+                    <a:lstStyle/>
+                    <a:p>
+                      <a:pPr algn="ctr"/>
+                      <a:r>
+                        <a:rPr lang="en-US" dirty="0"/>
+                        <a:t>40</a:t>
+                      </a:r>
+                    </a:p>
+                  </a:txBody>
+                  <a:tcPr/>
+                </a:tc>
+                <a:extLst>
+                  <a:ext uri="{0D108BD9-81ED-4DB2-BD59-A6C34878D82A}">
+                    <a16:rowId xmlns:a16="http://schemas.microsoft.com/office/drawing/2014/main" val="1833568562"/>
+                  </a:ext>
+                </a:extLst>
+              </a:tr>
+              <a:tr h="370840">
+                <a:tc>
+                  <a:txBody>
+                    <a:bodyPr/>
+                    <a:lstStyle/>
+                    <a:p>
+                      <a:pPr algn="ctr"/>
+                      <a:r>
+                        <a:rPr lang="en-US" dirty="0"/>
+                        <a:t>Subtraction</a:t>
+                      </a:r>
+                    </a:p>
+                  </a:txBody>
+                  <a:tcPr/>
+                </a:tc>
+                <a:tc>
+                  <a:txBody>
+                    <a:bodyPr/>
+                    <a:lstStyle/>
+                    <a:p>
+                      <a:pPr algn="ctr"/>
+                      <a:r>
+                        <a:rPr lang="en-US" dirty="0"/>
+                        <a:t>40</a:t>
+                      </a:r>
+                    </a:p>
+                  </a:txBody>
+                  <a:tcPr/>
+                </a:tc>
+                <a:extLst>
+                  <a:ext uri="{0D108BD9-81ED-4DB2-BD59-A6C34878D82A}">
+                    <a16:rowId xmlns:a16="http://schemas.microsoft.com/office/drawing/2014/main" val="1538440568"/>
+                  </a:ext>
+                </a:extLst>
+              </a:tr>
+              <a:tr h="370840">
+                <a:tc>
+                  <a:txBody>
+                    <a:bodyPr/>
+                    <a:lstStyle/>
+                    <a:p>
+                      <a:pPr algn="ctr"/>
+                      <a:r>
+                        <a:rPr lang="en-US" dirty="0"/>
+                        <a:t>Navigation</a:t>
+                      </a:r>
+                    </a:p>
+                  </a:txBody>
+                  <a:tcPr/>
+                </a:tc>
+                <a:tc>
+                  <a:txBody>
+                    <a:bodyPr/>
+                    <a:lstStyle/>
+                    <a:p>
+                      <a:pPr algn="ctr"/>
+                      <a:r>
+                        <a:rPr lang="en-US" dirty="0"/>
+                        <a:t>40</a:t>
+                      </a:r>
+                    </a:p>
+                  </a:txBody>
+                  <a:tcPr/>
+                </a:tc>
+                <a:extLst>
+                  <a:ext uri="{0D108BD9-81ED-4DB2-BD59-A6C34878D82A}">
+                    <a16:rowId xmlns:a16="http://schemas.microsoft.com/office/drawing/2014/main" val="2551714711"/>
+                  </a:ext>
+                </a:extLst>
+              </a:tr>
+              <a:tr h="370840">
+                <a:tc>
+                  <a:txBody>
+                    <a:bodyPr/>
+                    <a:lstStyle/>
+                    <a:p>
+                      <a:pPr algn="ctr"/>
+                      <a:r>
+                        <a:rPr lang="en-US" dirty="0"/>
+                        <a:t>Hand</a:t>
+                      </a:r>
+                    </a:p>
+                  </a:txBody>
+                  <a:tcPr/>
+                </a:tc>
+                <a:tc>
+                  <a:txBody>
+                    <a:bodyPr/>
+                    <a:lstStyle/>
+                    <a:p>
+                      <a:pPr algn="ctr"/>
+                      <a:r>
+                        <a:rPr lang="en-US" dirty="0"/>
+                        <a:t>40</a:t>
+                      </a:r>
+                    </a:p>
+                  </a:txBody>
+                  <a:tcPr/>
+                </a:tc>
+                <a:extLst>
+                  <a:ext uri="{0D108BD9-81ED-4DB2-BD59-A6C34878D82A}">
+                    <a16:rowId xmlns:a16="http://schemas.microsoft.com/office/drawing/2014/main" val="2760329176"/>
+                  </a:ext>
+                </a:extLst>
+              </a:tr>
+              <a:tr h="370840">
+                <a:tc>
+                  <a:txBody>
+                    <a:bodyPr/>
+                    <a:lstStyle/>
+                    <a:p>
+                      <a:pPr algn="ctr"/>
+                      <a:r>
+                        <a:rPr lang="en-US" dirty="0"/>
+                        <a:t>Feet</a:t>
+                      </a:r>
+                    </a:p>
+                  </a:txBody>
+                  <a:tcPr>
+                    <a:lnB w="12700" cap="flat" cmpd="sng" algn="ctr">
+                      <a:solidFill>
+                        <a:schemeClr val="tx1"/>
+                      </a:solidFill>
+                      <a:prstDash val="solid"/>
+                      <a:round/>
+                      <a:headEnd type="none" w="med" len="med"/>
+                      <a:tailEnd type="none" w="med" len="med"/>
+                    </a:lnB>
+                  </a:tcPr>
+                </a:tc>
+                <a:tc>
+                  <a:txBody>
+                    <a:bodyPr/>
+                    <a:lstStyle/>
+                    <a:p>
+                      <a:pPr algn="ctr"/>
+                      <a:r>
+                        <a:rPr lang="en-US" dirty="0"/>
+                        <a:t>40</a:t>
+                      </a:r>
+                    </a:p>
+                  </a:txBody>
+                  <a:tcPr>
+                    <a:lnB w="12700" cap="flat" cmpd="sng" algn="ctr">
+                      <a:solidFill>
+                        <a:schemeClr val="tx1"/>
+                      </a:solidFill>
+                      <a:prstDash val="solid"/>
+                      <a:round/>
+                      <a:headEnd type="none" w="med" len="med"/>
+                      <a:tailEnd type="none" w="med" len="med"/>
+                    </a:lnB>
+                  </a:tcPr>
+                </a:tc>
+                <a:extLst>
+                  <a:ext uri="{0D108BD9-81ED-4DB2-BD59-A6C34878D82A}">
+                    <a16:rowId xmlns:a16="http://schemas.microsoft.com/office/drawing/2014/main" val="1425515289"/>
+                  </a:ext>
+                </a:extLst>
+              </a:tr>
+              <a:tr h="370840">
+                <a:tc>
+                  <a:txBody>
+                    <a:bodyPr/>
+                    <a:lstStyle/>
+                    <a:p>
+                      <a:pPr algn="ctr"/>
+                      <a:r>
+                        <a:rPr lang="en-US" b="1" dirty="0"/>
+                        <a:t>Total</a:t>
+                      </a:r>
+                    </a:p>
+                  </a:txBody>
+                  <a:tcPr>
+                    <a:lnT w="12700" cap="flat" cmpd="sng" algn="ctr">
+                      <a:solidFill>
+                        <a:schemeClr val="tx1"/>
+                      </a:solidFill>
+                      <a:prstDash val="solid"/>
+                      <a:round/>
+                      <a:headEnd type="none" w="med" len="med"/>
+                      <a:tailEnd type="none" w="med" len="med"/>
+                    </a:lnT>
+                  </a:tcPr>
+                </a:tc>
+                <a:tc>
+                  <a:txBody>
+                    <a:bodyPr/>
+                    <a:lstStyle/>
+                    <a:p>
+                      <a:pPr algn="ctr"/>
+                      <a:r>
+                        <a:rPr lang="en-US" b="1" dirty="0"/>
+                        <a:t>200</a:t>
+                      </a:r>
+                    </a:p>
+                  </a:txBody>
+                  <a:tcPr>
+                    <a:lnT w="12700" cap="flat" cmpd="sng" algn="ctr">
+                      <a:solidFill>
+                        <a:schemeClr val="tx1"/>
+                      </a:solidFill>
+                      <a:prstDash val="solid"/>
+                      <a:round/>
+                      <a:headEnd type="none" w="med" len="med"/>
+                      <a:tailEnd type="none" w="med" len="med"/>
+                    </a:lnT>
+                  </a:tcPr>
+                </a:tc>
+                <a:extLst>
+                  <a:ext uri="{0D108BD9-81ED-4DB2-BD59-A6C34878D82A}">
+                    <a16:rowId xmlns:a16="http://schemas.microsoft.com/office/drawing/2014/main" val="3271621556"/>
+                  </a:ext>
+                </a:extLst>
+              </a:tr>
+            </a:tbl>
+          </a:graphicData>
+        </a:graphic>
+      </p:graphicFrame>
+      <p:sp>
+        <p:nvSpPr>
+          <p:cNvPr id="8" name="Arrow: Curved Left 7">
+            <a:extLst>
+              <a:ext uri="{FF2B5EF4-FFF2-40B4-BE49-F238E27FC236}">
+                <a16:creationId xmlns:a16="http://schemas.microsoft.com/office/drawing/2014/main" id="{03494C7F-8BFD-A06C-CEFD-71F20EC26856}"/>
+              </a:ext>
+            </a:extLst>
+          </p:cNvPr>
+          <p:cNvSpPr/>
+          <p:nvPr/>
+        </p:nvSpPr>
+        <p:spPr>
+          <a:xfrm>
+            <a:off x="6375634" y="2612508"/>
+            <a:ext cx="838899" cy="1476462"/>
+          </a:xfrm>
+          <a:prstGeom prst="curvedLeftArrow">
+            <a:avLst/>
+          </a:prstGeom>
+          <a:solidFill>
+            <a:srgbClr val="00B050"/>
+          </a:solidFill>
+          <a:ln>
+            <a:noFill/>
+          </a:ln>
+        </p:spPr>
+        <p:style>
+          <a:lnRef idx="2">
+            <a:schemeClr val="accent1">
+              <a:shade val="50000"/>
+            </a:schemeClr>
+          </a:lnRef>
+          <a:fillRef idx="1">
+            <a:schemeClr val="accent1"/>
+          </a:fillRef>
+          <a:effectRef idx="0">
+            <a:schemeClr val="accent1"/>
+          </a:effectRef>
+          <a:fontRef idx="minor">
+            <a:schemeClr val="lt1"/>
+          </a:fontRef>
+        </p:style>
+        <p:txBody>
+          <a:bodyPr rtlCol="0" anchor="ctr"/>
+          <a:lstStyle/>
+          <a:p>
+            <a:pPr algn="ctr"/>
+            <a:endParaRPr lang="en-US">
+              <a:solidFill>
+                <a:schemeClr val="tx1"/>
+              </a:solidFill>
+            </a:endParaRPr>
+          </a:p>
+        </p:txBody>
+      </p:sp>
+      <p:sp>
+        <p:nvSpPr>
+          <p:cNvPr id="9" name="Rectangle 8">
+            <a:extLst>
+              <a:ext uri="{FF2B5EF4-FFF2-40B4-BE49-F238E27FC236}">
+                <a16:creationId xmlns:a16="http://schemas.microsoft.com/office/drawing/2014/main" id="{388D7F63-ED16-73B6-EE2C-E061E154F08F}"/>
+              </a:ext>
+            </a:extLst>
+          </p:cNvPr>
+          <p:cNvSpPr/>
+          <p:nvPr/>
+        </p:nvSpPr>
+        <p:spPr>
+          <a:xfrm>
+            <a:off x="8102087" y="2813843"/>
+            <a:ext cx="3120705" cy="1073791"/>
+          </a:xfrm>
+          <a:prstGeom prst="rect">
+            <a:avLst/>
+          </a:prstGeom>
+          <a:ln w="38100">
+            <a:noFill/>
+          </a:ln>
+        </p:spPr>
+        <p:style>
+          <a:lnRef idx="2">
+            <a:schemeClr val="accent1">
+              <a:shade val="50000"/>
+            </a:schemeClr>
+          </a:lnRef>
+          <a:fillRef idx="1">
+            <a:schemeClr val="accent1"/>
+          </a:fillRef>
+          <a:effectRef idx="0">
+            <a:schemeClr val="accent1"/>
+          </a:effectRef>
+          <a:fontRef idx="minor">
+            <a:schemeClr val="lt1"/>
+          </a:fontRef>
+        </p:style>
+        <p:txBody>
+          <a:bodyPr rtlCol="0" anchor="ctr"/>
+          <a:lstStyle/>
+          <a:p>
+            <a:pPr algn="ctr"/>
+            <a:r>
+              <a:rPr lang="en-US" dirty="0"/>
+              <a:t>80 data points for each pairwise combination, split into train and test</a:t>
+            </a:r>
+          </a:p>
+        </p:txBody>
+      </p:sp>
+      <p:sp>
+        <p:nvSpPr>
+          <p:cNvPr id="10" name="TextBox 9">
+            <a:extLst>
+              <a:ext uri="{FF2B5EF4-FFF2-40B4-BE49-F238E27FC236}">
+                <a16:creationId xmlns:a16="http://schemas.microsoft.com/office/drawing/2014/main" id="{59CD9BB3-119C-0D67-4201-71DA34D319EB}"/>
+              </a:ext>
+            </a:extLst>
+          </p:cNvPr>
+          <p:cNvSpPr txBox="1"/>
+          <p:nvPr/>
+        </p:nvSpPr>
+        <p:spPr>
+          <a:xfrm>
+            <a:off x="7425714" y="2966017"/>
+            <a:ext cx="465192" cy="769441"/>
+          </a:xfrm>
+          <a:prstGeom prst="rect">
+            <a:avLst/>
+          </a:prstGeom>
+          <a:noFill/>
+        </p:spPr>
+        <p:txBody>
+          <a:bodyPr wrap="none" rtlCol="0">
+            <a:spAutoFit/>
+          </a:bodyPr>
+          <a:lstStyle/>
+          <a:p>
+            <a:r>
+              <a:rPr lang="en-US" sz="4400" dirty="0"/>
+              <a:t>=</a:t>
+            </a:r>
+          </a:p>
+        </p:txBody>
+      </p:sp>
+      <p:sp>
+        <p:nvSpPr>
+          <p:cNvPr id="11" name="Rectangle 10">
+            <a:extLst>
+              <a:ext uri="{FF2B5EF4-FFF2-40B4-BE49-F238E27FC236}">
+                <a16:creationId xmlns:a16="http://schemas.microsoft.com/office/drawing/2014/main" id="{7F5E5A63-F2ED-A658-3E66-199B7C6D2575}"/>
+              </a:ext>
+            </a:extLst>
+          </p:cNvPr>
+          <p:cNvSpPr/>
+          <p:nvPr/>
+        </p:nvSpPr>
+        <p:spPr>
+          <a:xfrm>
+            <a:off x="946279" y="5518738"/>
+            <a:ext cx="5362244" cy="535397"/>
+          </a:xfrm>
+          <a:prstGeom prst="rect">
+            <a:avLst/>
+          </a:prstGeom>
+          <a:ln w="38100">
+            <a:noFill/>
+          </a:ln>
+        </p:spPr>
+        <p:style>
+          <a:lnRef idx="2">
+            <a:schemeClr val="accent1">
+              <a:shade val="50000"/>
+            </a:schemeClr>
+          </a:lnRef>
+          <a:fillRef idx="1">
+            <a:schemeClr val="accent1"/>
+          </a:fillRef>
+          <a:effectRef idx="0">
+            <a:schemeClr val="accent1"/>
+          </a:effectRef>
+          <a:fontRef idx="minor">
+            <a:schemeClr val="lt1"/>
+          </a:fontRef>
+        </p:style>
+        <p:txBody>
+          <a:bodyPr rtlCol="0" anchor="ctr"/>
+          <a:lstStyle/>
+          <a:p>
+            <a:pPr algn="ctr"/>
+            <a:r>
+              <a:rPr lang="en-US" b="1" dirty="0"/>
+              <a:t>Day 2</a:t>
+            </a:r>
+          </a:p>
+        </p:txBody>
+      </p:sp>
+      <p:sp>
+        <p:nvSpPr>
+          <p:cNvPr id="12" name="Rectangle 11">
+            <a:extLst>
+              <a:ext uri="{FF2B5EF4-FFF2-40B4-BE49-F238E27FC236}">
+                <a16:creationId xmlns:a16="http://schemas.microsoft.com/office/drawing/2014/main" id="{79931702-D8C9-FFB0-4570-634652C5A99B}"/>
+              </a:ext>
+            </a:extLst>
+          </p:cNvPr>
+          <p:cNvSpPr/>
+          <p:nvPr/>
+        </p:nvSpPr>
+        <p:spPr>
+          <a:xfrm>
+            <a:off x="8102087" y="5279514"/>
+            <a:ext cx="3120705" cy="921617"/>
+          </a:xfrm>
+          <a:prstGeom prst="rect">
+            <a:avLst/>
+          </a:prstGeom>
+          <a:ln w="38100">
+            <a:noFill/>
+          </a:ln>
+        </p:spPr>
+        <p:style>
+          <a:lnRef idx="2">
+            <a:schemeClr val="accent1">
+              <a:shade val="50000"/>
+            </a:schemeClr>
+          </a:lnRef>
+          <a:fillRef idx="1">
+            <a:schemeClr val="accent1"/>
+          </a:fillRef>
+          <a:effectRef idx="0">
+            <a:schemeClr val="accent1"/>
+          </a:effectRef>
+          <a:fontRef idx="minor">
+            <a:schemeClr val="lt1"/>
+          </a:fontRef>
+        </p:style>
+        <p:txBody>
+          <a:bodyPr rtlCol="0" anchor="ctr"/>
+          <a:lstStyle/>
+          <a:p>
+            <a:pPr algn="ctr"/>
+            <a:r>
+              <a:rPr lang="en-US" dirty="0"/>
+              <a:t>Can’t look at it until testing final model</a:t>
+            </a:r>
+          </a:p>
+        </p:txBody>
+      </p:sp>
+      <p:sp>
+        <p:nvSpPr>
+          <p:cNvPr id="13" name="TextBox 12">
+            <a:extLst>
+              <a:ext uri="{FF2B5EF4-FFF2-40B4-BE49-F238E27FC236}">
+                <a16:creationId xmlns:a16="http://schemas.microsoft.com/office/drawing/2014/main" id="{985B1118-80B8-8B2F-2672-A4321AC42F73}"/>
+              </a:ext>
+            </a:extLst>
+          </p:cNvPr>
+          <p:cNvSpPr txBox="1"/>
+          <p:nvPr/>
+        </p:nvSpPr>
+        <p:spPr>
+          <a:xfrm>
+            <a:off x="6982555" y="5355601"/>
+            <a:ext cx="465192" cy="769441"/>
+          </a:xfrm>
+          <a:prstGeom prst="rect">
+            <a:avLst/>
+          </a:prstGeom>
+          <a:noFill/>
+        </p:spPr>
+        <p:txBody>
+          <a:bodyPr wrap="none" rtlCol="0">
+            <a:spAutoFit/>
+          </a:bodyPr>
+          <a:lstStyle/>
+          <a:p>
+            <a:r>
+              <a:rPr lang="en-US" sz="4400" dirty="0"/>
+              <a:t>=</a:t>
+            </a:r>
+          </a:p>
+        </p:txBody>
+      </p:sp>
+      <p:sp>
+        <p:nvSpPr>
+          <p:cNvPr id="14" name="Rectangle 13">
+            <a:extLst>
+              <a:ext uri="{FF2B5EF4-FFF2-40B4-BE49-F238E27FC236}">
+                <a16:creationId xmlns:a16="http://schemas.microsoft.com/office/drawing/2014/main" id="{D9388299-0856-EA29-B1C2-D6C80110827C}"/>
+              </a:ext>
+            </a:extLst>
+          </p:cNvPr>
+          <p:cNvSpPr/>
+          <p:nvPr/>
+        </p:nvSpPr>
+        <p:spPr>
+          <a:xfrm>
+            <a:off x="946278" y="1599390"/>
+            <a:ext cx="5362244" cy="535397"/>
+          </a:xfrm>
+          <a:prstGeom prst="rect">
+            <a:avLst/>
+          </a:prstGeom>
+          <a:ln w="38100">
+            <a:noFill/>
+          </a:ln>
+        </p:spPr>
+        <p:style>
+          <a:lnRef idx="2">
+            <a:schemeClr val="accent1">
+              <a:shade val="50000"/>
+            </a:schemeClr>
+          </a:lnRef>
+          <a:fillRef idx="1">
+            <a:schemeClr val="accent1"/>
+          </a:fillRef>
+          <a:effectRef idx="0">
+            <a:schemeClr val="accent1"/>
+          </a:effectRef>
+          <a:fontRef idx="minor">
+            <a:schemeClr val="lt1"/>
+          </a:fontRef>
+        </p:style>
+        <p:txBody>
+          <a:bodyPr rtlCol="0" anchor="ctr"/>
+          <a:lstStyle/>
+          <a:p>
+            <a:pPr algn="ctr"/>
+            <a:r>
+              <a:rPr lang="en-US" b="1" dirty="0"/>
+              <a:t>Day 1</a:t>
+            </a:r>
+          </a:p>
+        </p:txBody>
+      </p:sp>
+      <p:cxnSp>
+        <p:nvCxnSpPr>
+          <p:cNvPr id="16" name="Straight Connector 15">
+            <a:extLst>
+              <a:ext uri="{FF2B5EF4-FFF2-40B4-BE49-F238E27FC236}">
+                <a16:creationId xmlns:a16="http://schemas.microsoft.com/office/drawing/2014/main" id="{CC211778-073D-67BB-C762-5ADA69DE1EA0}"/>
+              </a:ext>
+            </a:extLst>
+          </p:cNvPr>
+          <p:cNvCxnSpPr/>
+          <p:nvPr/>
+        </p:nvCxnSpPr>
+        <p:spPr>
+          <a:xfrm>
+            <a:off x="946278" y="5008228"/>
+            <a:ext cx="10276514" cy="0"/>
+          </a:xfrm>
+          <a:prstGeom prst="line">
+            <a:avLst/>
+          </a:prstGeom>
+          <a:ln>
+            <a:solidFill>
+              <a:schemeClr val="tx1"/>
+            </a:solidFill>
+            <a:prstDash val="dash"/>
+          </a:ln>
+        </p:spPr>
+        <p:style>
+          <a:lnRef idx="1">
+            <a:schemeClr val="accent1"/>
+          </a:lnRef>
+          <a:fillRef idx="0">
+            <a:schemeClr val="accent1"/>
+          </a:fillRef>
+          <a:effectRef idx="0">
+            <a:schemeClr val="accent1"/>
+          </a:effectRef>
+          <a:fontRef idx="minor">
+            <a:schemeClr val="tx1"/>
+          </a:fontRef>
+        </p:style>
+      </p:cxnSp>
+    </p:spTree>
+    <p:extLst>
+      <p:ext uri="{BB962C8B-B14F-4D97-AF65-F5344CB8AC3E}">
+        <p14:creationId xmlns:p14="http://schemas.microsoft.com/office/powerpoint/2010/main" val="2150664694"/>
+      </p:ext>
+    </p:extLst>
+  </p:cSld>
+  <p:clrMapOvr>
+    <a:masterClrMapping/>
+  </p:clrMapOvr>
+</p:sld>
+</file>
+
+<file path=ppt/slides/slide6.xml><?xml version="1.0" encoding="utf-8"?>
+<p:sld xmlns:a="http://schemas.openxmlformats.org/drawingml/2006/main" xmlns:r="http://schemas.openxmlformats.org/officeDocument/2006/relationships" xmlns:p="http://schemas.openxmlformats.org/presentationml/2006/main">
+  <p:cSld>
+    <p:spTree>
+      <p:nvGrpSpPr>
+        <p:cNvPr id="1" name=""/>
+        <p:cNvGrpSpPr/>
+        <p:nvPr/>
+      </p:nvGrpSpPr>
+      <p:grpSpPr>
+        <a:xfrm>
+          <a:off x="0" y="0"/>
+          <a:ext cx="0" cy="0"/>
+          <a:chOff x="0" y="0"/>
+          <a:chExt cx="0" cy="0"/>
+        </a:xfrm>
+      </p:grpSpPr>
+      <p:sp>
+        <p:nvSpPr>
+          <p:cNvPr id="2" name="Title 1">
+            <a:extLst>
+              <a:ext uri="{FF2B5EF4-FFF2-40B4-BE49-F238E27FC236}">
                 <a16:creationId xmlns:a16="http://schemas.microsoft.com/office/drawing/2014/main" id="{2316C4C9-0FCE-68EE-1730-C451457DA7C5}"/>
               </a:ext>
             </a:extLst>
@@ -5077,8 +6889,8 @@
         </p:nvSpPr>
         <p:spPr>
           <a:xfrm>
-            <a:off x="1097280" y="1624285"/>
-            <a:ext cx="10058400" cy="4524315"/>
+            <a:off x="971445" y="1481672"/>
+            <a:ext cx="10058400" cy="4893647"/>
           </a:xfrm>
           <a:prstGeom prst="rect">
             <a:avLst/>
@@ -5097,32 +6909,12 @@
               <a:buAutoNum type="arabicPeriod"/>
             </a:pPr>
             <a:r>
-              <a:rPr lang="en-US" b="1" dirty="0"/>
+              <a:rPr lang="en-US" sz="2400" b="1" dirty="0"/>
               <a:t>Frequency filtering </a:t>
             </a:r>
             <a:r>
-              <a:rPr lang="en-US" dirty="0"/>
+              <a:rPr lang="en-US" sz="2400" dirty="0"/>
               <a:t>(low pass and high pass filters)</a:t>
-            </a:r>
-          </a:p>
-          <a:p>
-            <a:pPr marL="914400" lvl="1" indent="-457200">
-              <a:buFont typeface="+mj-lt"/>
-              <a:buAutoNum type="arabicPeriod"/>
-            </a:pPr>
-            <a:r>
-              <a:rPr lang="en-US" dirty="0"/>
-              <a:t>Fourier transformations are very cool</a:t>
-            </a:r>
-          </a:p>
-          <a:p>
-            <a:pPr marL="914400" lvl="1" indent="-457200">
-              <a:buFont typeface="+mj-lt"/>
-              <a:buAutoNum type="arabicPeriod"/>
-            </a:pPr>
-            <a:r>
-              <a:rPr lang="en-US" dirty="0"/>
-              <a:t>Helped some, but not as much as I would have liked</a:t>
             </a:r>
           </a:p>
           <a:p>
@@ -5131,42 +6923,7 @@
               <a:buFont typeface="+mj-lt"/>
               <a:buAutoNum type="arabicPeriod"/>
             </a:pPr>
-            <a:r>
-              <a:rPr lang="en-US" dirty="0"/>
-              <a:t>Use </a:t>
-            </a:r>
-            <a:r>
-              <a:rPr lang="en-US" b="1" dirty="0"/>
-              <a:t>signal-space projections (SSP) </a:t>
-            </a:r>
-            <a:r>
-              <a:rPr lang="en-US" dirty="0"/>
-              <a:t>and </a:t>
-            </a:r>
-            <a:r>
-              <a:rPr lang="en-US" b="1" dirty="0"/>
-              <a:t>independent component analysis (ICA)</a:t>
-            </a:r>
-          </a:p>
-          <a:p>
-            <a:pPr marL="914400" lvl="1" indent="-457200">
-              <a:buFont typeface="+mj-lt"/>
-              <a:buAutoNum type="arabicPeriod"/>
-            </a:pPr>
-            <a:r>
-              <a:rPr lang="en-US" dirty="0"/>
-              <a:t>Essentially methods for reducing dimensionality of data</a:t>
-            </a:r>
-          </a:p>
-          <a:p>
-            <a:pPr marL="914400" lvl="1" indent="-457200">
-              <a:buFont typeface="+mj-lt"/>
-              <a:buAutoNum type="arabicPeriod"/>
-            </a:pPr>
-            <a:r>
-              <a:rPr lang="en-US" dirty="0"/>
-              <a:t>Signal space projectors were fairly impactful</a:t>
-            </a:r>
+            <a:endParaRPr lang="en-US" sz="2400" dirty="0"/>
           </a:p>
           <a:p>
             <a:pPr marL="457200" indent="-457200">
@@ -5175,22 +6932,20 @@
               <a:buAutoNum type="arabicPeriod"/>
             </a:pPr>
             <a:r>
-              <a:rPr lang="en-US" b="1" dirty="0"/>
-              <a:t>Baseline correction </a:t>
-            </a:r>
-            <a:r>
-              <a:rPr lang="en-US" dirty="0"/>
-              <a:t>(subtract mean reading for each channel in pre-stimulus period from all signals in each trial)</a:t>
-            </a:r>
-          </a:p>
-          <a:p>
-            <a:pPr marL="914400" lvl="1" indent="-457200">
-              <a:buFont typeface="+mj-lt"/>
-              <a:buAutoNum type="arabicPeriod"/>
-            </a:pPr>
-            <a:r>
-              <a:rPr lang="en-US" dirty="0"/>
-              <a:t>Unsurprisingly didn’t help a bit</a:t>
+              <a:rPr lang="en-US" sz="2400" dirty="0"/>
+              <a:t>Use </a:t>
+            </a:r>
+            <a:r>
+              <a:rPr lang="en-US" sz="2400" b="1" dirty="0"/>
+              <a:t>signal-space projections (SSP) </a:t>
+            </a:r>
+            <a:r>
+              <a:rPr lang="en-US" sz="2400" dirty="0"/>
+              <a:t>and </a:t>
+            </a:r>
+            <a:r>
+              <a:rPr lang="en-US" sz="2400" b="1" dirty="0"/>
+              <a:t>independent component analysis (ICA)</a:t>
             </a:r>
           </a:p>
           <a:p>
@@ -5199,37 +6954,86 @@
               <a:buFont typeface="+mj-lt"/>
               <a:buAutoNum type="arabicPeriod"/>
             </a:pPr>
-            <a:r>
-              <a:rPr lang="en-US" b="1" dirty="0"/>
+            <a:endParaRPr lang="en-US" sz="2400" b="1" dirty="0"/>
+          </a:p>
+          <a:p>
+            <a:pPr marL="457200" indent="-457200">
+              <a:buClrTx/>
+              <a:buFont typeface="+mj-lt"/>
+              <a:buAutoNum type="arabicPeriod"/>
+            </a:pPr>
+            <a:r>
+              <a:rPr lang="en-US" sz="2400" b="1" dirty="0"/>
+              <a:t>Baseline correction</a:t>
+            </a:r>
+          </a:p>
+          <a:p>
+            <a:pPr marL="457200" indent="-457200">
+              <a:buClrTx/>
+              <a:buFont typeface="+mj-lt"/>
+              <a:buAutoNum type="arabicPeriod"/>
+            </a:pPr>
+            <a:endParaRPr lang="en-US" sz="2400" dirty="0"/>
+          </a:p>
+          <a:p>
+            <a:pPr marL="457200" indent="-457200">
+              <a:buClrTx/>
+              <a:buFont typeface="+mj-lt"/>
+              <a:buAutoNum type="arabicPeriod"/>
+            </a:pPr>
+            <a:r>
+              <a:rPr lang="en-US" sz="2400" b="1" dirty="0"/>
               <a:t>Decimate data </a:t>
             </a:r>
             <a:r>
-              <a:rPr lang="en-US" dirty="0"/>
+              <a:rPr lang="en-US" sz="2400" dirty="0"/>
               <a:t>(e.g., take every 2</a:t>
             </a:r>
             <a:r>
-              <a:rPr lang="en-US" baseline="30000" dirty="0"/>
+              <a:rPr lang="en-US" sz="2400" baseline="30000" dirty="0"/>
               <a:t>nd</a:t>
             </a:r>
             <a:r>
-              <a:rPr lang="en-US" dirty="0"/>
+              <a:rPr lang="en-US" sz="2400" dirty="0"/>
               <a:t>, 4</a:t>
             </a:r>
             <a:r>
-              <a:rPr lang="en-US" baseline="30000" dirty="0"/>
+              <a:rPr lang="en-US" sz="2400" baseline="30000" dirty="0"/>
               <a:t>th</a:t>
             </a:r>
             <a:r>
-              <a:rPr lang="en-US" dirty="0"/>
+              <a:rPr lang="en-US" sz="2400" dirty="0"/>
               <a:t>, and 8</a:t>
             </a:r>
             <a:r>
-              <a:rPr lang="en-US" baseline="30000" dirty="0"/>
+              <a:rPr lang="en-US" sz="2400" baseline="30000" dirty="0"/>
               <a:t>th</a:t>
             </a:r>
             <a:r>
-              <a:rPr lang="en-US" dirty="0"/>
+              <a:rPr lang="en-US" sz="2400" dirty="0"/>
               <a:t> samples)</a:t>
+            </a:r>
+          </a:p>
+          <a:p>
+            <a:pPr marL="457200" indent="-457200">
+              <a:buClrTx/>
+              <a:buFont typeface="+mj-lt"/>
+              <a:buAutoNum type="arabicPeriod"/>
+            </a:pPr>
+            <a:endParaRPr lang="en-US" sz="2400" dirty="0"/>
+          </a:p>
+          <a:p>
+            <a:pPr marL="457200" indent="-457200">
+              <a:buFont typeface="+mj-lt"/>
+              <a:buAutoNum type="arabicPeriod"/>
+            </a:pPr>
+            <a:r>
+              <a:rPr lang="en-US" sz="2400" b="1" dirty="0"/>
+              <a:t>Drop trials </a:t>
+            </a:r>
+            <a:r>
+              <a:rPr lang="en-US" sz="2400" dirty="0"/>
+              <a:t>based on peak-to-peak amplitude or lack of peak to trough amplitude</a:t>
             </a:r>
           </a:p>
           <a:p>
@@ -5237,10 +7041,7 @@
               <a:buFont typeface="+mj-lt"/>
               <a:buAutoNum type="arabicPeriod"/>
             </a:pPr>
-            <a:r>
-              <a:rPr lang="en-US" dirty="0"/>
-              <a:t>Helped some models, hurt others</a:t>
-            </a:r>
+            <a:endParaRPr lang="en-US" sz="2400" dirty="0"/>
           </a:p>
           <a:p>
             <a:pPr marL="457200" indent="-457200">
@@ -5248,54 +7049,12 @@
               <a:buAutoNum type="arabicPeriod"/>
             </a:pPr>
             <a:r>
-              <a:rPr lang="en-US" b="1" dirty="0"/>
-              <a:t>Drop trials </a:t>
-            </a:r>
-            <a:r>
-              <a:rPr lang="en-US" dirty="0"/>
-              <a:t>based on peak-to-peak amplitude or lack of peak to trough amplitude</a:t>
-            </a:r>
-          </a:p>
-          <a:p>
-            <a:pPr marL="914400" lvl="1" indent="-457200">
-              <a:buFont typeface="+mj-lt"/>
-              <a:buAutoNum type="arabicPeriod"/>
-            </a:pPr>
-            <a:r>
-              <a:rPr lang="en-US" dirty="0"/>
-              <a:t>Certainly helpful, but was not able to be programmatic about choices. Room for a custom tool or new tool within MNE built on top of </a:t>
-            </a:r>
-            <a:r>
-              <a:rPr lang="en-US" dirty="0" err="1"/>
-              <a:t>scipy</a:t>
-            </a:r>
-            <a:r>
-              <a:rPr lang="en-US" dirty="0"/>
-              <a:t> here.</a:t>
-            </a:r>
-          </a:p>
-          <a:p>
-            <a:pPr marL="457200" indent="-457200">
-              <a:buFont typeface="+mj-lt"/>
-              <a:buAutoNum type="arabicPeriod"/>
-            </a:pPr>
-            <a:r>
-              <a:rPr lang="en-US" b="1" dirty="0"/>
+              <a:rPr lang="en-US" sz="2400" b="1" dirty="0"/>
               <a:t>Common Spatial Patterns (CSP) </a:t>
             </a:r>
             <a:r>
-              <a:rPr lang="en-US" dirty="0"/>
+              <a:rPr lang="en-US" sz="2400" dirty="0"/>
               <a:t>to reduce dimensionality of data</a:t>
-            </a:r>
-          </a:p>
-          <a:p>
-            <a:pPr marL="914400" lvl="1" indent="-457200">
-              <a:buFont typeface="+mj-lt"/>
-              <a:buAutoNum type="arabicPeriod"/>
-            </a:pPr>
-            <a:r>
-              <a:rPr lang="en-US" dirty="0"/>
-              <a:t>By far the most impactful transformation that I tested</a:t>
             </a:r>
           </a:p>
         </p:txBody>
@@ -5313,7 +7072,7 @@
 </p:sld>
 </file>
 
-<file path=ppt/slides/slide5.xml><?xml version="1.0" encoding="utf-8"?>
+<file path=ppt/slides/slide7.xml><?xml version="1.0" encoding="utf-8"?>
 <p:sld xmlns:a="http://schemas.openxmlformats.org/drawingml/2006/main" xmlns:r="http://schemas.openxmlformats.org/officeDocument/2006/relationships" xmlns:p="http://schemas.openxmlformats.org/presentationml/2006/main">
   <p:cSld>
     <p:spTree>
@@ -5607,7 +7366,7 @@
 </p:sld>
 </file>
 
-<file path=ppt/slides/slide6.xml><?xml version="1.0" encoding="utf-8"?>
+<file path=ppt/slides/slide8.xml><?xml version="1.0" encoding="utf-8"?>
 <p:sld xmlns:a="http://schemas.openxmlformats.org/drawingml/2006/main" xmlns:r="http://schemas.openxmlformats.org/officeDocument/2006/relationships" xmlns:p="http://schemas.openxmlformats.org/presentationml/2006/main">
   <p:cSld>
     <p:spTree>
@@ -5714,7 +7473,7 @@
 </p:sld>
 </file>
 
-<file path=ppt/slides/slide7.xml><?xml version="1.0" encoding="utf-8"?>
+<file path=ppt/slides/slide9.xml><?xml version="1.0" encoding="utf-8"?>
 <p:sld xmlns:a="http://schemas.openxmlformats.org/drawingml/2006/main" xmlns:r="http://schemas.openxmlformats.org/officeDocument/2006/relationships" xmlns:p="http://schemas.openxmlformats.org/presentationml/2006/main">
   <p:cSld>
     <p:spTree>
@@ -5812,750 +7571,6 @@
     <p:extLst>
       <p:ext uri="{BB962C8B-B14F-4D97-AF65-F5344CB8AC3E}">
         <p14:creationId xmlns:p14="http://schemas.microsoft.com/office/powerpoint/2010/main" val="4106941997"/>
-      </p:ext>
-    </p:extLst>
-  </p:cSld>
-  <p:clrMapOvr>
-    <a:masterClrMapping/>
-  </p:clrMapOvr>
-</p:sld>
-</file>
-
-<file path=ppt/slides/slide8.xml><?xml version="1.0" encoding="utf-8"?>
-<p:sld xmlns:a="http://schemas.openxmlformats.org/drawingml/2006/main" xmlns:r="http://schemas.openxmlformats.org/officeDocument/2006/relationships" xmlns:p="http://schemas.openxmlformats.org/presentationml/2006/main">
-  <p:cSld>
-    <p:spTree>
-      <p:nvGrpSpPr>
-        <p:cNvPr id="1" name=""/>
-        <p:cNvGrpSpPr/>
-        <p:nvPr/>
-      </p:nvGrpSpPr>
-      <p:grpSpPr>
-        <a:xfrm>
-          <a:off x="0" y="0"/>
-          <a:ext cx="0" cy="0"/>
-          <a:chOff x="0" y="0"/>
-          <a:chExt cx="0" cy="0"/>
-        </a:xfrm>
-      </p:grpSpPr>
-      <p:sp>
-        <p:nvSpPr>
-          <p:cNvPr id="2" name="Title 1">
-            <a:extLst>
-              <a:ext uri="{FF2B5EF4-FFF2-40B4-BE49-F238E27FC236}">
-                <a16:creationId xmlns:a16="http://schemas.microsoft.com/office/drawing/2014/main" id="{74F9A59A-8F85-8064-2061-246353F06F08}"/>
-              </a:ext>
-            </a:extLst>
-          </p:cNvPr>
-          <p:cNvSpPr>
-            <a:spLocks noGrp="1"/>
-          </p:cNvSpPr>
-          <p:nvPr>
-            <p:ph type="title"/>
-          </p:nvPr>
-        </p:nvSpPr>
-        <p:spPr/>
-        <p:txBody>
-          <a:bodyPr>
-            <a:normAutofit fontScale="90000"/>
-          </a:bodyPr>
-          <a:lstStyle/>
-          <a:p>
-            <a:r>
-              <a:rPr lang="en-US" dirty="0"/>
-              <a:t>I combined several different kinds of models to try and solve the problem</a:t>
-            </a:r>
-          </a:p>
-        </p:txBody>
-      </p:sp>
-      <p:sp>
-        <p:nvSpPr>
-          <p:cNvPr id="4" name="Rectangle 3">
-            <a:extLst>
-              <a:ext uri="{FF2B5EF4-FFF2-40B4-BE49-F238E27FC236}">
-                <a16:creationId xmlns:a16="http://schemas.microsoft.com/office/drawing/2014/main" id="{A06A2A06-0481-46FC-222F-BC9AD944AF87}"/>
-              </a:ext>
-            </a:extLst>
-          </p:cNvPr>
-          <p:cNvSpPr/>
-          <p:nvPr/>
-        </p:nvSpPr>
-        <p:spPr>
-          <a:xfrm>
-            <a:off x="377505" y="1686187"/>
-            <a:ext cx="2474753" cy="645952"/>
-          </a:xfrm>
-          <a:prstGeom prst="rect">
-            <a:avLst/>
-          </a:prstGeom>
-        </p:spPr>
-        <p:style>
-          <a:lnRef idx="2">
-            <a:schemeClr val="accent1">
-              <a:shade val="50000"/>
-            </a:schemeClr>
-          </a:lnRef>
-          <a:fillRef idx="1">
-            <a:schemeClr val="accent1"/>
-          </a:fillRef>
-          <a:effectRef idx="0">
-            <a:schemeClr val="accent1"/>
-          </a:effectRef>
-          <a:fontRef idx="minor">
-            <a:schemeClr val="lt1"/>
-          </a:fontRef>
-        </p:style>
-        <p:txBody>
-          <a:bodyPr rtlCol="0" anchor="ctr"/>
-          <a:lstStyle/>
-          <a:p>
-            <a:pPr algn="ctr"/>
-            <a:r>
-              <a:rPr lang="en-US" dirty="0"/>
-              <a:t>Convolutional Neural Network (big filters)</a:t>
-            </a:r>
-          </a:p>
-        </p:txBody>
-      </p:sp>
-      <p:sp>
-        <p:nvSpPr>
-          <p:cNvPr id="5" name="Rectangle 4">
-            <a:extLst>
-              <a:ext uri="{FF2B5EF4-FFF2-40B4-BE49-F238E27FC236}">
-                <a16:creationId xmlns:a16="http://schemas.microsoft.com/office/drawing/2014/main" id="{6989E271-F6A2-536E-5E64-7C6490DC96AC}"/>
-              </a:ext>
-            </a:extLst>
-          </p:cNvPr>
-          <p:cNvSpPr/>
-          <p:nvPr/>
-        </p:nvSpPr>
-        <p:spPr>
-          <a:xfrm>
-            <a:off x="3366782" y="1686187"/>
-            <a:ext cx="2474753" cy="645952"/>
-          </a:xfrm>
-          <a:prstGeom prst="rect">
-            <a:avLst/>
-          </a:prstGeom>
-        </p:spPr>
-        <p:style>
-          <a:lnRef idx="2">
-            <a:schemeClr val="accent1">
-              <a:shade val="50000"/>
-            </a:schemeClr>
-          </a:lnRef>
-          <a:fillRef idx="1">
-            <a:schemeClr val="accent1"/>
-          </a:fillRef>
-          <a:effectRef idx="0">
-            <a:schemeClr val="accent1"/>
-          </a:effectRef>
-          <a:fontRef idx="minor">
-            <a:schemeClr val="lt1"/>
-          </a:fontRef>
-        </p:style>
-        <p:txBody>
-          <a:bodyPr rtlCol="0" anchor="ctr"/>
-          <a:lstStyle/>
-          <a:p>
-            <a:pPr algn="ctr"/>
-            <a:r>
-              <a:rPr lang="en-US" dirty="0"/>
-              <a:t>Convolutional Neural Network (small filters)</a:t>
-            </a:r>
-          </a:p>
-        </p:txBody>
-      </p:sp>
-      <p:sp>
-        <p:nvSpPr>
-          <p:cNvPr id="6" name="Rectangle 5">
-            <a:extLst>
-              <a:ext uri="{FF2B5EF4-FFF2-40B4-BE49-F238E27FC236}">
-                <a16:creationId xmlns:a16="http://schemas.microsoft.com/office/drawing/2014/main" id="{3B5506A1-B9C5-1D71-CE0D-470251B65E56}"/>
-              </a:ext>
-            </a:extLst>
-          </p:cNvPr>
-          <p:cNvSpPr/>
-          <p:nvPr/>
-        </p:nvSpPr>
-        <p:spPr>
-          <a:xfrm>
-            <a:off x="6356059" y="1686187"/>
-            <a:ext cx="2474753" cy="645952"/>
-          </a:xfrm>
-          <a:prstGeom prst="rect">
-            <a:avLst/>
-          </a:prstGeom>
-        </p:spPr>
-        <p:style>
-          <a:lnRef idx="2">
-            <a:schemeClr val="accent1">
-              <a:shade val="50000"/>
-            </a:schemeClr>
-          </a:lnRef>
-          <a:fillRef idx="1">
-            <a:schemeClr val="accent1"/>
-          </a:fillRef>
-          <a:effectRef idx="0">
-            <a:schemeClr val="accent1"/>
-          </a:effectRef>
-          <a:fontRef idx="minor">
-            <a:schemeClr val="lt1"/>
-          </a:fontRef>
-        </p:style>
-        <p:txBody>
-          <a:bodyPr rtlCol="0" anchor="ctr"/>
-          <a:lstStyle/>
-          <a:p>
-            <a:pPr algn="ctr"/>
-            <a:r>
-              <a:rPr lang="en-US" dirty="0"/>
-              <a:t>LDA + Common Spatial Patterns (CSP)</a:t>
-            </a:r>
-          </a:p>
-        </p:txBody>
-      </p:sp>
-      <p:sp>
-        <p:nvSpPr>
-          <p:cNvPr id="7" name="Rectangle 6">
-            <a:extLst>
-              <a:ext uri="{FF2B5EF4-FFF2-40B4-BE49-F238E27FC236}">
-                <a16:creationId xmlns:a16="http://schemas.microsoft.com/office/drawing/2014/main" id="{537E2423-C766-2DE1-F64C-3FD21312726E}"/>
-              </a:ext>
-            </a:extLst>
-          </p:cNvPr>
-          <p:cNvSpPr/>
-          <p:nvPr/>
-        </p:nvSpPr>
-        <p:spPr>
-          <a:xfrm>
-            <a:off x="9345336" y="1686187"/>
-            <a:ext cx="2474753" cy="645952"/>
-          </a:xfrm>
-          <a:prstGeom prst="rect">
-            <a:avLst/>
-          </a:prstGeom>
-        </p:spPr>
-        <p:style>
-          <a:lnRef idx="2">
-            <a:schemeClr val="accent1">
-              <a:shade val="50000"/>
-            </a:schemeClr>
-          </a:lnRef>
-          <a:fillRef idx="1">
-            <a:schemeClr val="accent1"/>
-          </a:fillRef>
-          <a:effectRef idx="0">
-            <a:schemeClr val="accent1"/>
-          </a:effectRef>
-          <a:fontRef idx="minor">
-            <a:schemeClr val="lt1"/>
-          </a:fontRef>
-        </p:style>
-        <p:txBody>
-          <a:bodyPr rtlCol="0" anchor="ctr"/>
-          <a:lstStyle/>
-          <a:p>
-            <a:pPr algn="ctr"/>
-            <a:r>
-              <a:rPr lang="en-US" dirty="0"/>
-              <a:t>Neural Network + CSP</a:t>
-            </a:r>
-          </a:p>
-        </p:txBody>
-      </p:sp>
-      <p:sp>
-        <p:nvSpPr>
-          <p:cNvPr id="8" name="Rectangle: Rounded Corners 7">
-            <a:extLst>
-              <a:ext uri="{FF2B5EF4-FFF2-40B4-BE49-F238E27FC236}">
-                <a16:creationId xmlns:a16="http://schemas.microsoft.com/office/drawing/2014/main" id="{0752376E-7849-8DE2-FF3F-8980E6E8C19E}"/>
-              </a:ext>
-            </a:extLst>
-          </p:cNvPr>
-          <p:cNvSpPr/>
-          <p:nvPr/>
-        </p:nvSpPr>
-        <p:spPr>
-          <a:xfrm>
-            <a:off x="4472730" y="3465558"/>
-            <a:ext cx="3246539" cy="907821"/>
-          </a:xfrm>
-          <a:prstGeom prst="roundRect">
-            <a:avLst/>
-          </a:prstGeom>
-        </p:spPr>
-        <p:style>
-          <a:lnRef idx="2">
-            <a:schemeClr val="accent1">
-              <a:shade val="50000"/>
-            </a:schemeClr>
-          </a:lnRef>
-          <a:fillRef idx="1">
-            <a:schemeClr val="accent1"/>
-          </a:fillRef>
-          <a:effectRef idx="0">
-            <a:schemeClr val="accent1"/>
-          </a:effectRef>
-          <a:fontRef idx="minor">
-            <a:schemeClr val="lt1"/>
-          </a:fontRef>
-        </p:style>
-        <p:txBody>
-          <a:bodyPr rtlCol="0" anchor="ctr"/>
-          <a:lstStyle/>
-          <a:p>
-            <a:pPr algn="ctr"/>
-            <a:r>
-              <a:rPr lang="en-US" dirty="0"/>
-              <a:t>Neural Network</a:t>
-            </a:r>
-          </a:p>
-        </p:txBody>
-      </p:sp>
-      <p:cxnSp>
-        <p:nvCxnSpPr>
-          <p:cNvPr id="10" name="Straight Arrow Connector 9">
-            <a:extLst>
-              <a:ext uri="{FF2B5EF4-FFF2-40B4-BE49-F238E27FC236}">
-                <a16:creationId xmlns:a16="http://schemas.microsoft.com/office/drawing/2014/main" id="{1831FCB1-A12B-D4E2-60EB-1B239137D9F8}"/>
-              </a:ext>
-            </a:extLst>
-          </p:cNvPr>
-          <p:cNvCxnSpPr>
-            <a:cxnSpLocks/>
-            <a:stCxn id="4" idx="2"/>
-            <a:endCxn id="8" idx="0"/>
-          </p:cNvCxnSpPr>
-          <p:nvPr/>
-        </p:nvCxnSpPr>
-        <p:spPr>
-          <a:xfrm>
-            <a:off x="1614882" y="2332139"/>
-            <a:ext cx="4481118" cy="1133419"/>
-          </a:xfrm>
-          <a:prstGeom prst="straightConnector1">
-            <a:avLst/>
-          </a:prstGeom>
-          <a:ln>
-            <a:solidFill>
-              <a:schemeClr val="tx1"/>
-            </a:solidFill>
-            <a:tailEnd type="triangle"/>
-          </a:ln>
-        </p:spPr>
-        <p:style>
-          <a:lnRef idx="1">
-            <a:schemeClr val="accent1"/>
-          </a:lnRef>
-          <a:fillRef idx="0">
-            <a:schemeClr val="accent1"/>
-          </a:fillRef>
-          <a:effectRef idx="0">
-            <a:schemeClr val="accent1"/>
-          </a:effectRef>
-          <a:fontRef idx="minor">
-            <a:schemeClr val="tx1"/>
-          </a:fontRef>
-        </p:style>
-      </p:cxnSp>
-      <p:cxnSp>
-        <p:nvCxnSpPr>
-          <p:cNvPr id="11" name="Straight Arrow Connector 10">
-            <a:extLst>
-              <a:ext uri="{FF2B5EF4-FFF2-40B4-BE49-F238E27FC236}">
-                <a16:creationId xmlns:a16="http://schemas.microsoft.com/office/drawing/2014/main" id="{244EABB5-8591-A018-70EA-832E81B0D82B}"/>
-              </a:ext>
-            </a:extLst>
-          </p:cNvPr>
-          <p:cNvCxnSpPr>
-            <a:cxnSpLocks/>
-            <a:stCxn id="6" idx="2"/>
-            <a:endCxn id="8" idx="0"/>
-          </p:cNvCxnSpPr>
-          <p:nvPr/>
-        </p:nvCxnSpPr>
-        <p:spPr>
-          <a:xfrm flipH="1">
-            <a:off x="6096000" y="2332139"/>
-            <a:ext cx="1497436" cy="1133419"/>
-          </a:xfrm>
-          <a:prstGeom prst="straightConnector1">
-            <a:avLst/>
-          </a:prstGeom>
-          <a:ln>
-            <a:solidFill>
-              <a:schemeClr val="tx1"/>
-            </a:solidFill>
-            <a:tailEnd type="triangle"/>
-          </a:ln>
-        </p:spPr>
-        <p:style>
-          <a:lnRef idx="1">
-            <a:schemeClr val="accent1"/>
-          </a:lnRef>
-          <a:fillRef idx="0">
-            <a:schemeClr val="accent1"/>
-          </a:fillRef>
-          <a:effectRef idx="0">
-            <a:schemeClr val="accent1"/>
-          </a:effectRef>
-          <a:fontRef idx="minor">
-            <a:schemeClr val="tx1"/>
-          </a:fontRef>
-        </p:style>
-      </p:cxnSp>
-      <p:cxnSp>
-        <p:nvCxnSpPr>
-          <p:cNvPr id="12" name="Straight Arrow Connector 11">
-            <a:extLst>
-              <a:ext uri="{FF2B5EF4-FFF2-40B4-BE49-F238E27FC236}">
-                <a16:creationId xmlns:a16="http://schemas.microsoft.com/office/drawing/2014/main" id="{17D11D63-4149-16FD-3269-F1A2661204BD}"/>
-              </a:ext>
-            </a:extLst>
-          </p:cNvPr>
-          <p:cNvCxnSpPr>
-            <a:cxnSpLocks/>
-            <a:stCxn id="5" idx="2"/>
-            <a:endCxn id="8" idx="0"/>
-          </p:cNvCxnSpPr>
-          <p:nvPr/>
-        </p:nvCxnSpPr>
-        <p:spPr>
-          <a:xfrm>
-            <a:off x="4604159" y="2332139"/>
-            <a:ext cx="1491841" cy="1133419"/>
-          </a:xfrm>
-          <a:prstGeom prst="straightConnector1">
-            <a:avLst/>
-          </a:prstGeom>
-          <a:ln>
-            <a:solidFill>
-              <a:schemeClr val="tx1"/>
-            </a:solidFill>
-            <a:tailEnd type="triangle"/>
-          </a:ln>
-        </p:spPr>
-        <p:style>
-          <a:lnRef idx="1">
-            <a:schemeClr val="accent1"/>
-          </a:lnRef>
-          <a:fillRef idx="0">
-            <a:schemeClr val="accent1"/>
-          </a:fillRef>
-          <a:effectRef idx="0">
-            <a:schemeClr val="accent1"/>
-          </a:effectRef>
-          <a:fontRef idx="minor">
-            <a:schemeClr val="tx1"/>
-          </a:fontRef>
-        </p:style>
-      </p:cxnSp>
-      <p:cxnSp>
-        <p:nvCxnSpPr>
-          <p:cNvPr id="13" name="Straight Arrow Connector 12">
-            <a:extLst>
-              <a:ext uri="{FF2B5EF4-FFF2-40B4-BE49-F238E27FC236}">
-                <a16:creationId xmlns:a16="http://schemas.microsoft.com/office/drawing/2014/main" id="{BEFB6A13-85C6-DD79-710A-7AB5D159259F}"/>
-              </a:ext>
-            </a:extLst>
-          </p:cNvPr>
-          <p:cNvCxnSpPr>
-            <a:cxnSpLocks/>
-            <a:stCxn id="7" idx="2"/>
-            <a:endCxn id="8" idx="0"/>
-          </p:cNvCxnSpPr>
-          <p:nvPr/>
-        </p:nvCxnSpPr>
-        <p:spPr>
-          <a:xfrm flipH="1">
-            <a:off x="6096000" y="2332139"/>
-            <a:ext cx="4486713" cy="1133419"/>
-          </a:xfrm>
-          <a:prstGeom prst="straightConnector1">
-            <a:avLst/>
-          </a:prstGeom>
-          <a:ln>
-            <a:solidFill>
-              <a:schemeClr val="tx1"/>
-            </a:solidFill>
-            <a:tailEnd type="triangle"/>
-          </a:ln>
-        </p:spPr>
-        <p:style>
-          <a:lnRef idx="1">
-            <a:schemeClr val="accent1"/>
-          </a:lnRef>
-          <a:fillRef idx="0">
-            <a:schemeClr val="accent1"/>
-          </a:fillRef>
-          <a:effectRef idx="0">
-            <a:schemeClr val="accent1"/>
-          </a:effectRef>
-          <a:fontRef idx="minor">
-            <a:schemeClr val="tx1"/>
-          </a:fontRef>
-        </p:style>
-      </p:cxnSp>
-      <p:sp>
-        <p:nvSpPr>
-          <p:cNvPr id="20" name="Arrow: Down 19">
-            <a:extLst>
-              <a:ext uri="{FF2B5EF4-FFF2-40B4-BE49-F238E27FC236}">
-                <a16:creationId xmlns:a16="http://schemas.microsoft.com/office/drawing/2014/main" id="{3B7005A1-3A0B-E7F6-9C14-20D0FB4BFE58}"/>
-              </a:ext>
-            </a:extLst>
-          </p:cNvPr>
-          <p:cNvSpPr/>
-          <p:nvPr/>
-        </p:nvSpPr>
-        <p:spPr>
-          <a:xfrm>
-            <a:off x="5728003" y="4638978"/>
-            <a:ext cx="796954" cy="385893"/>
-          </a:xfrm>
-          <a:prstGeom prst="downArrow">
-            <a:avLst/>
-          </a:prstGeom>
-        </p:spPr>
-        <p:style>
-          <a:lnRef idx="2">
-            <a:schemeClr val="accent1">
-              <a:shade val="50000"/>
-            </a:schemeClr>
-          </a:lnRef>
-          <a:fillRef idx="1">
-            <a:schemeClr val="accent1"/>
-          </a:fillRef>
-          <a:effectRef idx="0">
-            <a:schemeClr val="accent1"/>
-          </a:effectRef>
-          <a:fontRef idx="minor">
-            <a:schemeClr val="lt1"/>
-          </a:fontRef>
-        </p:style>
-        <p:txBody>
-          <a:bodyPr rtlCol="0" anchor="ctr"/>
-          <a:lstStyle/>
-          <a:p>
-            <a:pPr algn="ctr"/>
-            <a:endParaRPr lang="en-US"/>
-          </a:p>
-        </p:txBody>
-      </p:sp>
-      <p:sp>
-        <p:nvSpPr>
-          <p:cNvPr id="34" name="Rectangle: Rounded Corners 33">
-            <a:extLst>
-              <a:ext uri="{FF2B5EF4-FFF2-40B4-BE49-F238E27FC236}">
-                <a16:creationId xmlns:a16="http://schemas.microsoft.com/office/drawing/2014/main" id="{454E6CD6-6884-E1BE-A4E9-54E00A2985D4}"/>
-              </a:ext>
-            </a:extLst>
-          </p:cNvPr>
-          <p:cNvSpPr/>
-          <p:nvPr/>
-        </p:nvSpPr>
-        <p:spPr>
-          <a:xfrm>
-            <a:off x="4472730" y="5290470"/>
-            <a:ext cx="3246539" cy="907821"/>
-          </a:xfrm>
-          <a:prstGeom prst="roundRect">
-            <a:avLst/>
-          </a:prstGeom>
-          <a:noFill/>
-          <a:ln>
-            <a:solidFill>
-              <a:schemeClr val="tx1"/>
-            </a:solidFill>
-          </a:ln>
-        </p:spPr>
-        <p:style>
-          <a:lnRef idx="2">
-            <a:schemeClr val="accent1">
-              <a:shade val="50000"/>
-            </a:schemeClr>
-          </a:lnRef>
-          <a:fillRef idx="1">
-            <a:schemeClr val="accent1"/>
-          </a:fillRef>
-          <a:effectRef idx="0">
-            <a:schemeClr val="accent1"/>
-          </a:effectRef>
-          <a:fontRef idx="minor">
-            <a:schemeClr val="lt1"/>
-          </a:fontRef>
-        </p:style>
-        <p:txBody>
-          <a:bodyPr rtlCol="0" anchor="ctr"/>
-          <a:lstStyle/>
-          <a:p>
-            <a:pPr algn="ctr"/>
-            <a:r>
-              <a:rPr lang="en-US" sz="2400" b="1" dirty="0">
-                <a:solidFill>
-                  <a:schemeClr val="tx1"/>
-                </a:solidFill>
-              </a:rPr>
-              <a:t>Final prediction for each trial</a:t>
-            </a:r>
-          </a:p>
-        </p:txBody>
-      </p:sp>
-    </p:spTree>
-    <p:extLst>
-      <p:ext uri="{BB962C8B-B14F-4D97-AF65-F5344CB8AC3E}">
-        <p14:creationId xmlns:p14="http://schemas.microsoft.com/office/powerpoint/2010/main" val="442744482"/>
-      </p:ext>
-    </p:extLst>
-  </p:cSld>
-  <p:clrMapOvr>
-    <a:masterClrMapping/>
-  </p:clrMapOvr>
-</p:sld>
-</file>
-
-<file path=ppt/slides/slide9.xml><?xml version="1.0" encoding="utf-8"?>
-<p:sld xmlns:a="http://schemas.openxmlformats.org/drawingml/2006/main" xmlns:r="http://schemas.openxmlformats.org/officeDocument/2006/relationships" xmlns:p="http://schemas.openxmlformats.org/presentationml/2006/main">
-  <p:cSld>
-    <p:spTree>
-      <p:nvGrpSpPr>
-        <p:cNvPr id="1" name=""/>
-        <p:cNvGrpSpPr/>
-        <p:nvPr/>
-      </p:nvGrpSpPr>
-      <p:grpSpPr>
-        <a:xfrm>
-          <a:off x="0" y="0"/>
-          <a:ext cx="0" cy="0"/>
-          <a:chOff x="0" y="0"/>
-          <a:chExt cx="0" cy="0"/>
-        </a:xfrm>
-      </p:grpSpPr>
-      <p:sp>
-        <p:nvSpPr>
-          <p:cNvPr id="2" name="Title 1">
-            <a:extLst>
-              <a:ext uri="{FF2B5EF4-FFF2-40B4-BE49-F238E27FC236}">
-                <a16:creationId xmlns:a16="http://schemas.microsoft.com/office/drawing/2014/main" id="{3E26E113-3C10-B170-4384-8FA3A4338117}"/>
-              </a:ext>
-            </a:extLst>
-          </p:cNvPr>
-          <p:cNvSpPr>
-            <a:spLocks noGrp="1"/>
-          </p:cNvSpPr>
-          <p:nvPr>
-            <p:ph type="title"/>
-          </p:nvPr>
-        </p:nvSpPr>
-        <p:spPr/>
-        <p:txBody>
-          <a:bodyPr>
-            <a:normAutofit fontScale="90000"/>
-          </a:bodyPr>
-          <a:lstStyle/>
-          <a:p>
-            <a:r>
-              <a:rPr lang="en-US" dirty="0"/>
-              <a:t>The original study achieved 80% average accuracy across the nine subjects</a:t>
-            </a:r>
-          </a:p>
-        </p:txBody>
-      </p:sp>
-      <p:pic>
-        <p:nvPicPr>
-          <p:cNvPr id="5" name="Picture 4">
-            <a:extLst>
-              <a:ext uri="{FF2B5EF4-FFF2-40B4-BE49-F238E27FC236}">
-                <a16:creationId xmlns:a16="http://schemas.microsoft.com/office/drawing/2014/main" id="{A2009750-1979-EAC8-1FA9-CA30927C80C7}"/>
-              </a:ext>
-            </a:extLst>
-          </p:cNvPr>
-          <p:cNvPicPr>
-            <a:picLocks noChangeAspect="1"/>
-          </p:cNvPicPr>
-          <p:nvPr/>
-        </p:nvPicPr>
-        <p:blipFill rotWithShape="1">
-          <a:blip r:embed="rId2"/>
-          <a:srcRect t="584" b="-1"/>
-          <a:stretch/>
-        </p:blipFill>
-        <p:spPr>
-          <a:xfrm>
-            <a:off x="1885339" y="1761687"/>
-            <a:ext cx="7867650" cy="3759359"/>
-          </a:xfrm>
-          <a:prstGeom prst="rect">
-            <a:avLst/>
-          </a:prstGeom>
-        </p:spPr>
-      </p:pic>
-      <p:sp>
-        <p:nvSpPr>
-          <p:cNvPr id="6" name="TextBox 5">
-            <a:extLst>
-              <a:ext uri="{FF2B5EF4-FFF2-40B4-BE49-F238E27FC236}">
-                <a16:creationId xmlns:a16="http://schemas.microsoft.com/office/drawing/2014/main" id="{6310D4D4-7C04-3ED8-4B3C-57CF034CC350}"/>
-              </a:ext>
-            </a:extLst>
-          </p:cNvPr>
-          <p:cNvSpPr txBox="1"/>
-          <p:nvPr/>
-        </p:nvSpPr>
-        <p:spPr>
-          <a:xfrm>
-            <a:off x="188093" y="5747550"/>
-            <a:ext cx="11081752" cy="1107996"/>
-          </a:xfrm>
-          <a:prstGeom prst="rect">
-            <a:avLst/>
-          </a:prstGeom>
-          <a:noFill/>
-        </p:spPr>
-        <p:txBody>
-          <a:bodyPr wrap="none" rtlCol="0">
-            <a:spAutoFit/>
-          </a:bodyPr>
-          <a:lstStyle/>
-          <a:p>
-            <a:r>
-              <a:rPr lang="en-US" sz="1600" dirty="0"/>
-              <a:t>Source: Reinhold Scherer, Josef Faller, Elisabeth V. C. Friedrich, Eloy </a:t>
-            </a:r>
-            <a:r>
-              <a:rPr lang="en-US" sz="1600" dirty="0" err="1"/>
-              <a:t>Opisso</a:t>
-            </a:r>
-            <a:r>
-              <a:rPr lang="en-US" sz="1600" dirty="0"/>
-              <a:t>, Ursula Costa, Andrea Kübler, and Gernot R. Müller-Putz:</a:t>
-            </a:r>
-          </a:p>
-          <a:p>
-            <a:r>
-              <a:rPr lang="en-US" sz="1600" b="0" i="1" dirty="0">
-                <a:solidFill>
-                  <a:srgbClr val="000000"/>
-                </a:solidFill>
-                <a:effectLst/>
-                <a:latin typeface="Cambria" panose="02040503050406030204" pitchFamily="18" charset="0"/>
-              </a:rPr>
-              <a:t>Individually Adapted Imagery Improves Brain-Computer Interface Performance in End-Users with Disability</a:t>
-            </a:r>
-          </a:p>
-          <a:p>
-            <a:endParaRPr lang="en-US" sz="1600" dirty="0"/>
-          </a:p>
-          <a:p>
-            <a:endParaRPr lang="en-US" sz="1600" dirty="0"/>
-          </a:p>
-        </p:txBody>
-      </p:sp>
-    </p:spTree>
-    <p:extLst>
-      <p:ext uri="{BB962C8B-B14F-4D97-AF65-F5344CB8AC3E}">
-        <p14:creationId xmlns:p14="http://schemas.microsoft.com/office/powerpoint/2010/main" val="3392253816"/>
       </p:ext>
     </p:extLst>
   </p:cSld>

</xml_diff>